<commit_message>
Starting project, all settings was done!
</commit_message>
<xml_diff>
--- a/Oralce_C  _Programmimg_Guide.pptx
+++ b/Oralce_C  _Programmimg_Guide.pptx
@@ -312,7 +312,7 @@
           <a:p>
             <a:fld id="{08C806B3-D79A-4E76-A2D8-F9ADBAFB48B1}" type="datetimeFigureOut">
               <a:rPr lang="en-CA" smtClean="0"/>
-              <a:t>2022-05-11</a:t>
+              <a:t>2024-04-13</a:t>
             </a:fld>
             <a:endParaRPr lang="en-CA"/>
           </a:p>
@@ -540,7 +540,7 @@
           <a:p>
             <a:fld id="{08C806B3-D79A-4E76-A2D8-F9ADBAFB48B1}" type="datetimeFigureOut">
               <a:rPr lang="en-CA" smtClean="0"/>
-              <a:t>2022-05-11</a:t>
+              <a:t>2024-04-13</a:t>
             </a:fld>
             <a:endParaRPr lang="en-CA"/>
           </a:p>
@@ -720,7 +720,7 @@
           <a:p>
             <a:fld id="{08C806B3-D79A-4E76-A2D8-F9ADBAFB48B1}" type="datetimeFigureOut">
               <a:rPr lang="en-CA" smtClean="0"/>
-              <a:t>2022-05-11</a:t>
+              <a:t>2024-04-13</a:t>
             </a:fld>
             <a:endParaRPr lang="en-CA"/>
           </a:p>
@@ -890,7 +890,7 @@
           <a:p>
             <a:fld id="{08C806B3-D79A-4E76-A2D8-F9ADBAFB48B1}" type="datetimeFigureOut">
               <a:rPr lang="en-CA" smtClean="0"/>
-              <a:t>2022-05-11</a:t>
+              <a:t>2024-04-13</a:t>
             </a:fld>
             <a:endParaRPr lang="en-CA"/>
           </a:p>
@@ -1144,7 +1144,7 @@
           <a:p>
             <a:fld id="{08C806B3-D79A-4E76-A2D8-F9ADBAFB48B1}" type="datetimeFigureOut">
               <a:rPr lang="en-CA" smtClean="0"/>
-              <a:t>2022-05-11</a:t>
+              <a:t>2024-04-13</a:t>
             </a:fld>
             <a:endParaRPr lang="en-CA"/>
           </a:p>
@@ -1470,7 +1470,7 @@
           <a:p>
             <a:fld id="{08C806B3-D79A-4E76-A2D8-F9ADBAFB48B1}" type="datetimeFigureOut">
               <a:rPr lang="en-CA" smtClean="0"/>
-              <a:t>2022-05-11</a:t>
+              <a:t>2024-04-13</a:t>
             </a:fld>
             <a:endParaRPr lang="en-CA"/>
           </a:p>
@@ -1921,7 +1921,7 @@
           <a:p>
             <a:fld id="{08C806B3-D79A-4E76-A2D8-F9ADBAFB48B1}" type="datetimeFigureOut">
               <a:rPr lang="en-CA" smtClean="0"/>
-              <a:t>2022-05-11</a:t>
+              <a:t>2024-04-13</a:t>
             </a:fld>
             <a:endParaRPr lang="en-CA"/>
           </a:p>
@@ -2039,7 +2039,7 @@
           <a:p>
             <a:fld id="{08C806B3-D79A-4E76-A2D8-F9ADBAFB48B1}" type="datetimeFigureOut">
               <a:rPr lang="en-CA" smtClean="0"/>
-              <a:t>2022-05-11</a:t>
+              <a:t>2024-04-13</a:t>
             </a:fld>
             <a:endParaRPr lang="en-CA"/>
           </a:p>
@@ -2134,7 +2134,7 @@
           <a:p>
             <a:fld id="{08C806B3-D79A-4E76-A2D8-F9ADBAFB48B1}" type="datetimeFigureOut">
               <a:rPr lang="en-CA" smtClean="0"/>
-              <a:t>2022-05-11</a:t>
+              <a:t>2024-04-13</a:t>
             </a:fld>
             <a:endParaRPr lang="en-CA"/>
           </a:p>
@@ -2421,7 +2421,7 @@
           <a:p>
             <a:fld id="{08C806B3-D79A-4E76-A2D8-F9ADBAFB48B1}" type="datetimeFigureOut">
               <a:rPr lang="en-CA" smtClean="0"/>
-              <a:t>2022-05-11</a:t>
+              <a:t>2024-04-13</a:t>
             </a:fld>
             <a:endParaRPr lang="en-CA"/>
           </a:p>
@@ -2743,7 +2743,7 @@
           <a:p>
             <a:fld id="{08C806B3-D79A-4E76-A2D8-F9ADBAFB48B1}" type="datetimeFigureOut">
               <a:rPr lang="en-CA" smtClean="0"/>
-              <a:t>2022-05-11</a:t>
+              <a:t>2024-04-13</a:t>
             </a:fld>
             <a:endParaRPr lang="en-CA"/>
           </a:p>
@@ -2997,7 +2997,7 @@
           <a:p>
             <a:fld id="{08C806B3-D79A-4E76-A2D8-F9ADBAFB48B1}" type="datetimeFigureOut">
               <a:rPr lang="en-CA" smtClean="0"/>
-              <a:t>2022-05-11</a:t>
+              <a:t>2024-04-13</a:t>
             </a:fld>
             <a:endParaRPr lang="en-CA"/>
           </a:p>
@@ -3504,14 +3504,14 @@
           <a:p>
             <a:pPr algn="ctr"/>
             <a:r>
-              <a:rPr lang="en-US" altLang="en-US" dirty="0" smtClean="0"/>
+              <a:rPr lang="en-US" altLang="en-US" dirty="0"/>
               <a:t>Oracle/C++</a:t>
             </a:r>
             <a:br>
-              <a:rPr lang="en-US" altLang="en-US" dirty="0" smtClean="0"/>
+              <a:rPr lang="en-US" altLang="en-US" dirty="0"/>
             </a:br>
             <a:r>
-              <a:rPr lang="en-US" altLang="en-US" dirty="0" smtClean="0"/>
+              <a:rPr lang="en-US" altLang="en-US" dirty="0"/>
               <a:t>Application Programming</a:t>
             </a:r>
             <a:endParaRPr lang="en-CA" dirty="0"/>
@@ -3536,12 +3536,12 @@
           <a:lstStyle/>
           <a:p>
             <a:pPr algn="ctr"/>
-            <a:endParaRPr lang="en-US" dirty="0" smtClean="0"/>
+            <a:endParaRPr lang="en-US" dirty="0"/>
           </a:p>
           <a:p>
             <a:pPr algn="ctr"/>
             <a:r>
-              <a:rPr lang="en-US" dirty="0" smtClean="0"/>
+              <a:rPr lang="en-US" dirty="0"/>
               <a:t> </a:t>
             </a:r>
           </a:p>
@@ -3619,7 +3619,7 @@
           <a:lstStyle/>
           <a:p>
             <a:r>
-              <a:rPr lang="en-US" dirty="0" smtClean="0"/>
+              <a:rPr lang="en-US" dirty="0"/>
               <a:t>The </a:t>
             </a:r>
             <a:r>
@@ -3627,17 +3627,17 @@
               <a:t>executeUpdate</a:t>
             </a:r>
             <a:r>
-              <a:rPr lang="en-CA" i="1" dirty="0" smtClean="0"/>
+              <a:rPr lang="en-CA" i="1" dirty="0"/>
               <a:t>() </a:t>
             </a:r>
             <a:r>
-              <a:rPr lang="en-CA" dirty="0" smtClean="0"/>
+              <a:rPr lang="en-CA" dirty="0"/>
               <a:t>executes a SQL INSERT, UPDATE, DELETE, and a DDL statements CREATE/ALTER.</a:t>
             </a:r>
           </a:p>
           <a:p>
             <a:r>
-              <a:rPr lang="en-US" dirty="0" smtClean="0"/>
+              <a:rPr lang="en-US" dirty="0"/>
               <a:t>It returns the number of rows affected by the SQL statement execution.</a:t>
             </a:r>
             <a:endParaRPr lang="en-CA" dirty="0"/>
@@ -3715,12 +3715,8 @@
           <a:lstStyle/>
           <a:p>
             <a:r>
-              <a:rPr lang="en-US" dirty="0" smtClean="0"/>
-              <a:t>Terminate </a:t>
-            </a:r>
-            <a:r>
               <a:rPr lang="en-US" dirty="0"/>
-              <a:t>and deallocate a </a:t>
+              <a:t>Terminate and deallocate a </a:t>
             </a:r>
             <a:r>
               <a:rPr lang="en-US" i="1" dirty="0"/>
@@ -3728,35 +3724,31 @@
             </a:r>
             <a:r>
               <a:rPr lang="en-US" dirty="0"/>
-              <a:t> object using </a:t>
-            </a:r>
-            <a:r>
-              <a:rPr lang="en-US" dirty="0" smtClean="0"/>
-              <a:t>the following statement:</a:t>
+              <a:t> object using the following statement:</a:t>
             </a:r>
           </a:p>
           <a:p>
             <a:pPr lvl="1"/>
             <a:r>
-              <a:rPr lang="en-CA" dirty="0" err="1" smtClean="0"/>
+              <a:rPr lang="en-CA" dirty="0" err="1"/>
               <a:t>terminateStatement</a:t>
             </a:r>
             <a:r>
-              <a:rPr lang="en-CA" dirty="0" smtClean="0"/>
+              <a:rPr lang="en-CA" dirty="0"/>
               <a:t>()</a:t>
             </a:r>
           </a:p>
           <a:p>
             <a:r>
-              <a:rPr lang="en-US" dirty="0" smtClean="0"/>
+              <a:rPr lang="en-US" dirty="0"/>
               <a:t>See the following code that closes a statement object </a:t>
             </a:r>
             <a:r>
-              <a:rPr lang="en-US" dirty="0" err="1" smtClean="0"/>
+              <a:rPr lang="en-US" dirty="0" err="1"/>
               <a:t>stmt</a:t>
             </a:r>
             <a:r>
-              <a:rPr lang="en-US" dirty="0" smtClean="0"/>
+              <a:rPr lang="en-US" dirty="0"/>
               <a:t>:</a:t>
             </a:r>
           </a:p>
@@ -3863,11 +3855,11 @@
           <a:lstStyle/>
           <a:p>
             <a:r>
-              <a:rPr lang="en-US" dirty="0" err="1" smtClean="0"/>
+              <a:rPr lang="en-US" dirty="0" err="1"/>
               <a:t>executeUpdate</a:t>
             </a:r>
             <a:r>
-              <a:rPr lang="en-US" dirty="0" smtClean="0"/>
+              <a:rPr lang="en-US" dirty="0"/>
               <a:t>() – Create a Table</a:t>
             </a:r>
             <a:endParaRPr lang="en-CA" dirty="0"/>
@@ -3944,11 +3936,11 @@
           <a:lstStyle/>
           <a:p>
             <a:r>
-              <a:rPr lang="en-US" dirty="0" err="1" smtClean="0"/>
+              <a:rPr lang="en-US" dirty="0" err="1"/>
               <a:t>executeUpdate</a:t>
             </a:r>
             <a:r>
-              <a:rPr lang="en-US" dirty="0" smtClean="0"/>
+              <a:rPr lang="en-US" dirty="0"/>
               <a:t>() – Drop a Table</a:t>
             </a:r>
             <a:endParaRPr lang="en-CA" dirty="0"/>
@@ -4025,11 +4017,11 @@
           <a:lstStyle/>
           <a:p>
             <a:r>
-              <a:rPr lang="en-US" dirty="0" err="1" smtClean="0"/>
+              <a:rPr lang="en-US" dirty="0" err="1"/>
               <a:t>createStatement</a:t>
             </a:r>
             <a:r>
-              <a:rPr lang="en-US" dirty="0" smtClean="0"/>
+              <a:rPr lang="en-US" dirty="0"/>
               <a:t> - Example</a:t>
             </a:r>
             <a:endParaRPr lang="en-CA" dirty="0"/>
@@ -4117,7 +4109,7 @@
           <a:lstStyle/>
           <a:p>
             <a:r>
-              <a:rPr lang="en-US" dirty="0" smtClean="0"/>
+              <a:rPr lang="en-US" dirty="0"/>
               <a:t>or</a:t>
             </a:r>
             <a:endParaRPr lang="en-CA" dirty="0"/>
@@ -4296,7 +4288,7 @@
           <a:lstStyle/>
           <a:p>
             <a:r>
-              <a:rPr lang="en-US" sz="2400" dirty="0" smtClean="0"/>
+              <a:rPr lang="en-US" sz="2400" dirty="0"/>
               <a:t>There are three types of SQL statements in OCCI.</a:t>
             </a:r>
           </a:p>
@@ -4306,30 +4298,20 @@
               <a:rPr lang="en-US" sz="2000" dirty="0"/>
               <a:t>Standard Statements </a:t>
             </a:r>
-            <a:endParaRPr lang="en-US" sz="2000" dirty="0" smtClean="0"/>
           </a:p>
           <a:p>
             <a:pPr lvl="2"/>
             <a:r>
-              <a:rPr lang="en-US" sz="1600" dirty="0" smtClean="0"/>
-              <a:t>use </a:t>
-            </a:r>
-            <a:r>
               <a:rPr lang="en-US" sz="1600" dirty="0"/>
-              <a:t>SQL commands with specified values</a:t>
+              <a:t>use SQL commands with specified values</a:t>
             </a:r>
           </a:p>
           <a:p>
             <a:pPr lvl="1"/>
             <a:r>
-              <a:rPr lang="en-US" sz="2000" dirty="0" smtClean="0"/>
-              <a:t>Parameterized </a:t>
-            </a:r>
-            <a:r>
               <a:rPr lang="en-US" sz="2000" dirty="0"/>
-              <a:t>Statements </a:t>
-            </a:r>
-            <a:endParaRPr lang="en-US" sz="2000" dirty="0" smtClean="0"/>
+              <a:t>Parameterized Statements </a:t>
+            </a:r>
           </a:p>
           <a:p>
             <a:pPr lvl="2"/>
@@ -4341,14 +4323,9 @@
           <a:p>
             <a:pPr lvl="1"/>
             <a:r>
-              <a:rPr lang="en-US" sz="2000" dirty="0" smtClean="0"/>
-              <a:t>Callable </a:t>
-            </a:r>
-            <a:r>
               <a:rPr lang="en-US" sz="2000" dirty="0"/>
-              <a:t>Statements </a:t>
-            </a:r>
-            <a:endParaRPr lang="en-US" sz="2000" dirty="0" smtClean="0"/>
+              <a:t>Callable Statements </a:t>
+            </a:r>
           </a:p>
           <a:p>
             <a:pPr lvl="2"/>
@@ -4428,13 +4405,13 @@
           <a:lstStyle/>
           <a:p>
             <a:r>
-              <a:rPr lang="en-US" dirty="0" smtClean="0"/>
+              <a:rPr lang="en-US" dirty="0"/>
               <a:t>In standard statements, the values are explicitly specified.</a:t>
             </a:r>
           </a:p>
           <a:p>
             <a:r>
-              <a:rPr lang="en-US" dirty="0" smtClean="0"/>
+              <a:rPr lang="en-US" dirty="0"/>
               <a:t>See the following example:</a:t>
             </a:r>
           </a:p>
@@ -4651,7 +4628,7 @@
           <a:lstStyle/>
           <a:p>
             <a:r>
-              <a:rPr lang="en-US" dirty="0" smtClean="0"/>
+              <a:rPr lang="en-US" dirty="0"/>
               <a:t>Standard Insert Statement</a:t>
             </a:r>
             <a:endParaRPr lang="en-CA" dirty="0"/>
@@ -4753,46 +4730,42 @@
           <a:p>
             <a:r>
               <a:rPr lang="en-US" dirty="0"/>
-              <a:t>A</a:t>
-            </a:r>
-            <a:r>
-              <a:rPr lang="en-US" dirty="0" smtClean="0"/>
-              <a:t> statement can be executed with different values using parameters as placeholders for the input values.</a:t>
+              <a:t>A statement can be executed with different values using parameters as placeholders for the input values.</a:t>
             </a:r>
           </a:p>
           <a:p>
             <a:pPr lvl="1"/>
             <a:r>
-              <a:rPr lang="en-US" dirty="0" smtClean="0"/>
+              <a:rPr lang="en-US" dirty="0"/>
               <a:t>The </a:t>
             </a:r>
             <a:r>
-              <a:rPr lang="en-US" i="1" dirty="0" err="1" smtClean="0"/>
+              <a:rPr lang="en-US" i="1" dirty="0" err="1"/>
               <a:t>setxxx</a:t>
             </a:r>
             <a:r>
-              <a:rPr lang="en-US" i="1" dirty="0" smtClean="0"/>
+              <a:rPr lang="en-US" i="1" dirty="0"/>
               <a:t>()</a:t>
             </a:r>
             <a:r>
-              <a:rPr lang="en-US" dirty="0" smtClean="0"/>
+              <a:rPr lang="en-US" dirty="0"/>
               <a:t> is used to specify parameters.</a:t>
             </a:r>
           </a:p>
           <a:p>
             <a:pPr lvl="1"/>
             <a:r>
-              <a:rPr lang="en-US" i="1" dirty="0" smtClean="0"/>
+              <a:rPr lang="en-US" i="1" dirty="0"/>
               <a:t>XXX</a:t>
             </a:r>
             <a:r>
-              <a:rPr lang="en-US" dirty="0" smtClean="0"/>
+              <a:rPr lang="en-US" dirty="0"/>
               <a:t> stands for the type of the parameter.</a:t>
             </a:r>
           </a:p>
           <a:p>
             <a:r>
-              <a:rPr lang="en-US" dirty="0" smtClean="0"/>
+              <a:rPr lang="en-US" dirty="0"/>
               <a:t>See the following example:</a:t>
             </a:r>
           </a:p>
@@ -4801,7 +4774,7 @@
               <a:buNone/>
             </a:pPr>
             <a:r>
-              <a:rPr lang="en-CA" dirty="0" err="1" smtClean="0">
+              <a:rPr lang="en-CA" dirty="0" err="1">
                 <a:solidFill>
                   <a:srgbClr val="FF0000"/>
                 </a:solidFill>
@@ -4811,7 +4784,7 @@
               <a:t>setSQL</a:t>
             </a:r>
             <a:r>
-              <a:rPr lang="en-CA" dirty="0" smtClean="0">
+              <a:rPr lang="en-CA" dirty="0">
                 <a:solidFill>
                   <a:srgbClr val="FF0000"/>
                 </a:solidFill>
@@ -4821,16 +4794,6 @@
               <a:t>("INSERT </a:t>
             </a:r>
             <a:r>
-              <a:rPr lang="en-US" dirty="0" smtClean="0">
-                <a:solidFill>
-                  <a:srgbClr val="FF0000"/>
-                </a:solidFill>
-                <a:latin typeface="Courier New" panose="02070309020205020404" pitchFamily="49" charset="0"/>
-                <a:cs typeface="Courier New" panose="02070309020205020404" pitchFamily="49" charset="0"/>
-              </a:rPr>
-              <a:t>INTO student VALUES (:</a:t>
-            </a:r>
-            <a:r>
               <a:rPr lang="en-US" dirty="0">
                 <a:solidFill>
                   <a:srgbClr val="FF0000"/>
@@ -4838,17 +4801,7 @@
                 <a:latin typeface="Courier New" panose="02070309020205020404" pitchFamily="49" charset="0"/>
                 <a:cs typeface="Courier New" panose="02070309020205020404" pitchFamily="49" charset="0"/>
               </a:rPr>
-              <a:t>1,:2</a:t>
-            </a:r>
-            <a:r>
-              <a:rPr lang="en-US" dirty="0" smtClean="0">
-                <a:solidFill>
-                  <a:srgbClr val="FF0000"/>
-                </a:solidFill>
-                <a:latin typeface="Courier New" panose="02070309020205020404" pitchFamily="49" charset="0"/>
-                <a:cs typeface="Courier New" panose="02070309020205020404" pitchFamily="49" charset="0"/>
-              </a:rPr>
-              <a:t>)</a:t>
+              <a:t>INTO student VALUES (:1,:2)</a:t>
             </a:r>
             <a:r>
               <a:rPr lang="en-CA" dirty="0">
@@ -4861,7 +4814,7 @@
               <a:t> "</a:t>
             </a:r>
             <a:r>
-              <a:rPr lang="en-US" dirty="0" smtClean="0">
+              <a:rPr lang="en-US" dirty="0">
                 <a:solidFill>
                   <a:srgbClr val="FF0000"/>
                 </a:solidFill>
@@ -4874,19 +4827,19 @@
           <a:p>
             <a:pPr lvl="1"/>
             <a:r>
-              <a:rPr lang="en-US" dirty="0" smtClean="0"/>
+              <a:rPr lang="en-US" dirty="0"/>
               <a:t>You first need to specify the statement using the </a:t>
             </a:r>
             <a:r>
-              <a:rPr lang="en-US" i="1" dirty="0" err="1" smtClean="0"/>
+              <a:rPr lang="en-US" i="1" dirty="0" err="1"/>
               <a:t>setSQL</a:t>
             </a:r>
             <a:r>
-              <a:rPr lang="en-US" i="1" dirty="0" smtClean="0"/>
+              <a:rPr lang="en-US" i="1" dirty="0"/>
               <a:t>()</a:t>
             </a:r>
             <a:r>
-              <a:rPr lang="en-US" dirty="0" smtClean="0"/>
+              <a:rPr lang="en-US" dirty="0"/>
               <a:t> method.</a:t>
             </a:r>
           </a:p>
@@ -4915,7 +4868,7 @@
               <a:t>-&gt;</a:t>
             </a:r>
             <a:r>
-              <a:rPr lang="en-US" b="1" dirty="0" err="1" smtClean="0">
+              <a:rPr lang="en-US" b="1" dirty="0" err="1">
                 <a:solidFill>
                   <a:srgbClr val="FF0000"/>
                 </a:solidFill>
@@ -4925,16 +4878,6 @@
               <a:t>setInt</a:t>
             </a:r>
             <a:r>
-              <a:rPr lang="en-US" b="1" dirty="0" smtClean="0">
-                <a:solidFill>
-                  <a:srgbClr val="FF0000"/>
-                </a:solidFill>
-                <a:latin typeface="Courier New" panose="02070309020205020404" pitchFamily="49" charset="0"/>
-                <a:cs typeface="Courier New" panose="02070309020205020404" pitchFamily="49" charset="0"/>
-              </a:rPr>
-              <a:t>(1, 1003); </a:t>
-            </a:r>
-            <a:r>
               <a:rPr lang="en-US" b="1" dirty="0">
                 <a:solidFill>
                   <a:srgbClr val="FF0000"/>
@@ -4942,29 +4885,9 @@
                 <a:latin typeface="Courier New" panose="02070309020205020404" pitchFamily="49" charset="0"/>
                 <a:cs typeface="Courier New" panose="02070309020205020404" pitchFamily="49" charset="0"/>
               </a:rPr>
-              <a:t>// value for </a:t>
-            </a:r>
-            <a:r>
-              <a:rPr lang="en-US" b="1" dirty="0" smtClean="0">
-                <a:solidFill>
-                  <a:srgbClr val="FF0000"/>
-                </a:solidFill>
-                <a:latin typeface="Courier New" panose="02070309020205020404" pitchFamily="49" charset="0"/>
-                <a:cs typeface="Courier New" panose="02070309020205020404" pitchFamily="49" charset="0"/>
-              </a:rPr>
-              <a:t>first </a:t>
-            </a:r>
-            <a:r>
-              <a:rPr lang="en-US" b="1" dirty="0">
-                <a:solidFill>
-                  <a:srgbClr val="FF0000"/>
-                </a:solidFill>
-                <a:latin typeface="Courier New" panose="02070309020205020404" pitchFamily="49" charset="0"/>
-                <a:cs typeface="Courier New" panose="02070309020205020404" pitchFamily="49" charset="0"/>
-              </a:rPr>
-              <a:t>parameter</a:t>
-            </a:r>
-            <a:endParaRPr lang="en-CA" b="1" dirty="0" smtClean="0">
+              <a:t>(1, 1003); // value for first parameter</a:t>
+            </a:r>
+            <a:endParaRPr lang="en-CA" b="1" dirty="0">
               <a:solidFill>
                 <a:srgbClr val="FF0000"/>
               </a:solidFill>
@@ -4977,7 +4900,7 @@
               <a:buNone/>
             </a:pPr>
             <a:r>
-              <a:rPr lang="en-CA" b="1" dirty="0" err="1" smtClean="0">
+              <a:rPr lang="en-CA" b="1" dirty="0" err="1">
                 <a:solidFill>
                   <a:srgbClr val="FF0000"/>
                 </a:solidFill>
@@ -4987,16 +4910,6 @@
               <a:t>stmt</a:t>
             </a:r>
             <a:r>
-              <a:rPr lang="en-CA" b="1" dirty="0" smtClean="0">
-                <a:solidFill>
-                  <a:srgbClr val="FF0000"/>
-                </a:solidFill>
-                <a:latin typeface="Courier New" panose="02070309020205020404" pitchFamily="49" charset="0"/>
-                <a:cs typeface="Courier New" panose="02070309020205020404" pitchFamily="49" charset="0"/>
-              </a:rPr>
-              <a:t>-</a:t>
-            </a:r>
-            <a:r>
               <a:rPr lang="en-CA" b="1" dirty="0">
                 <a:solidFill>
                   <a:srgbClr val="FF0000"/>
@@ -5004,10 +4917,10 @@
                 <a:latin typeface="Courier New" panose="02070309020205020404" pitchFamily="49" charset="0"/>
                 <a:cs typeface="Courier New" panose="02070309020205020404" pitchFamily="49" charset="0"/>
               </a:rPr>
-              <a:t>&gt;</a:t>
-            </a:r>
-            <a:r>
-              <a:rPr lang="en-CA" b="1" dirty="0" err="1" smtClean="0">
+              <a:t>-&gt;</a:t>
+            </a:r>
+            <a:r>
+              <a:rPr lang="en-CA" b="1" dirty="0" err="1">
                 <a:solidFill>
                   <a:srgbClr val="FF0000"/>
                 </a:solidFill>
@@ -5017,16 +4930,6 @@
               <a:t>setString</a:t>
             </a:r>
             <a:r>
-              <a:rPr lang="en-CA" b="1" dirty="0" smtClean="0">
-                <a:solidFill>
-                  <a:srgbClr val="FF0000"/>
-                </a:solidFill>
-                <a:latin typeface="Courier New" panose="02070309020205020404" pitchFamily="49" charset="0"/>
-                <a:cs typeface="Courier New" panose="02070309020205020404" pitchFamily="49" charset="0"/>
-              </a:rPr>
-              <a:t>(2, "Nick Shine"); </a:t>
-            </a:r>
-            <a:r>
               <a:rPr lang="en-CA" b="1" dirty="0">
                 <a:solidFill>
                   <a:srgbClr val="FF0000"/>
@@ -5034,17 +4937,7 @@
                 <a:latin typeface="Courier New" panose="02070309020205020404" pitchFamily="49" charset="0"/>
                 <a:cs typeface="Courier New" panose="02070309020205020404" pitchFamily="49" charset="0"/>
               </a:rPr>
-              <a:t>// value for </a:t>
-            </a:r>
-            <a:r>
-              <a:rPr lang="en-CA" b="1" dirty="0" smtClean="0">
-                <a:solidFill>
-                  <a:srgbClr val="FF0000"/>
-                </a:solidFill>
-                <a:latin typeface="Courier New" panose="02070309020205020404" pitchFamily="49" charset="0"/>
-                <a:cs typeface="Courier New" panose="02070309020205020404" pitchFamily="49" charset="0"/>
-              </a:rPr>
-              <a:t>second parameter</a:t>
+              <a:t>(2, "Nick Shine"); // value for second parameter</a:t>
             </a:r>
             <a:endParaRPr lang="en-US" b="1" dirty="0">
               <a:solidFill>
@@ -5104,7 +4997,7 @@
               <a:buNone/>
             </a:pPr>
             <a:r>
-              <a:rPr lang="en-CA" b="1" dirty="0" smtClean="0">
+              <a:rPr lang="en-CA" b="1" dirty="0">
                 <a:solidFill>
                   <a:srgbClr val="FF0000"/>
                 </a:solidFill>
@@ -5139,7 +5032,7 @@
               <a:t>-&gt;</a:t>
             </a:r>
             <a:r>
-              <a:rPr lang="en-US" b="1" dirty="0" err="1" smtClean="0">
+              <a:rPr lang="en-US" b="1" dirty="0" err="1">
                 <a:solidFill>
                   <a:srgbClr val="FF0000"/>
                 </a:solidFill>
@@ -5149,16 +5042,6 @@
               <a:t>setInt</a:t>
             </a:r>
             <a:r>
-              <a:rPr lang="en-US" b="1" dirty="0" smtClean="0">
-                <a:solidFill>
-                  <a:srgbClr val="FF0000"/>
-                </a:solidFill>
-                <a:latin typeface="Courier New" panose="02070309020205020404" pitchFamily="49" charset="0"/>
-                <a:cs typeface="Courier New" panose="02070309020205020404" pitchFamily="49" charset="0"/>
-              </a:rPr>
-              <a:t>(1, 1004); </a:t>
-            </a:r>
-            <a:r>
               <a:rPr lang="en-US" b="1" dirty="0">
                 <a:solidFill>
                   <a:srgbClr val="FF0000"/>
@@ -5166,27 +5049,7 @@
                 <a:latin typeface="Courier New" panose="02070309020205020404" pitchFamily="49" charset="0"/>
                 <a:cs typeface="Courier New" panose="02070309020205020404" pitchFamily="49" charset="0"/>
               </a:rPr>
-              <a:t>// value for </a:t>
-            </a:r>
-            <a:r>
-              <a:rPr lang="en-US" b="1" dirty="0" smtClean="0">
-                <a:solidFill>
-                  <a:srgbClr val="FF0000"/>
-                </a:solidFill>
-                <a:latin typeface="Courier New" panose="02070309020205020404" pitchFamily="49" charset="0"/>
-                <a:cs typeface="Courier New" panose="02070309020205020404" pitchFamily="49" charset="0"/>
-              </a:rPr>
-              <a:t>first </a:t>
-            </a:r>
-            <a:r>
-              <a:rPr lang="en-US" b="1" dirty="0">
-                <a:solidFill>
-                  <a:srgbClr val="FF0000"/>
-                </a:solidFill>
-                <a:latin typeface="Courier New" panose="02070309020205020404" pitchFamily="49" charset="0"/>
-                <a:cs typeface="Courier New" panose="02070309020205020404" pitchFamily="49" charset="0"/>
-              </a:rPr>
-              <a:t>parameter</a:t>
+              <a:t>(1, 1004); // value for first parameter</a:t>
             </a:r>
             <a:endParaRPr lang="en-CA" b="1" dirty="0">
               <a:solidFill>
@@ -5221,7 +5084,7 @@
               <a:t>-&gt;</a:t>
             </a:r>
             <a:r>
-              <a:rPr lang="en-CA" b="1" dirty="0" err="1" smtClean="0">
+              <a:rPr lang="en-CA" b="1" dirty="0" err="1">
                 <a:solidFill>
                   <a:srgbClr val="FF0000"/>
                 </a:solidFill>
@@ -5231,16 +5094,6 @@
               <a:t>setString</a:t>
             </a:r>
             <a:r>
-              <a:rPr lang="en-CA" b="1" dirty="0" smtClean="0">
-                <a:solidFill>
-                  <a:srgbClr val="FF0000"/>
-                </a:solidFill>
-                <a:latin typeface="Courier New" panose="02070309020205020404" pitchFamily="49" charset="0"/>
-                <a:cs typeface="Courier New" panose="02070309020205020404" pitchFamily="49" charset="0"/>
-              </a:rPr>
-              <a:t>(2, </a:t>
-            </a:r>
-            <a:r>
               <a:rPr lang="en-CA" b="1" dirty="0">
                 <a:solidFill>
                   <a:srgbClr val="FF0000"/>
@@ -5248,37 +5101,7 @@
                 <a:latin typeface="Courier New" panose="02070309020205020404" pitchFamily="49" charset="0"/>
                 <a:cs typeface="Courier New" panose="02070309020205020404" pitchFamily="49" charset="0"/>
               </a:rPr>
-              <a:t>"</a:t>
-            </a:r>
-            <a:r>
-              <a:rPr lang="en-CA" b="1" dirty="0" smtClean="0">
-                <a:solidFill>
-                  <a:srgbClr val="FF0000"/>
-                </a:solidFill>
-                <a:latin typeface="Courier New" panose="02070309020205020404" pitchFamily="49" charset="0"/>
-                <a:cs typeface="Courier New" panose="02070309020205020404" pitchFamily="49" charset="0"/>
-              </a:rPr>
-              <a:t>Adam Sandler"); </a:t>
-            </a:r>
-            <a:r>
-              <a:rPr lang="en-CA" b="1" dirty="0">
-                <a:solidFill>
-                  <a:srgbClr val="FF0000"/>
-                </a:solidFill>
-                <a:latin typeface="Courier New" panose="02070309020205020404" pitchFamily="49" charset="0"/>
-                <a:cs typeface="Courier New" panose="02070309020205020404" pitchFamily="49" charset="0"/>
-              </a:rPr>
-              <a:t>// value for </a:t>
-            </a:r>
-            <a:r>
-              <a:rPr lang="en-CA" b="1" dirty="0" smtClean="0">
-                <a:solidFill>
-                  <a:srgbClr val="FF0000"/>
-                </a:solidFill>
-                <a:latin typeface="Courier New" panose="02070309020205020404" pitchFamily="49" charset="0"/>
-                <a:cs typeface="Courier New" panose="02070309020205020404" pitchFamily="49" charset="0"/>
-              </a:rPr>
-              <a:t>second parameter</a:t>
+              <a:t>(2, "Adam Sandler"); // value for second parameter</a:t>
             </a:r>
             <a:endParaRPr lang="en-US" b="1" dirty="0">
               <a:solidFill>
@@ -5332,7 +5155,7 @@
               </a:rPr>
               <a:t>(); // execute statement</a:t>
             </a:r>
-            <a:endParaRPr lang="en-US" b="1" dirty="0" smtClean="0">
+            <a:endParaRPr lang="en-US" b="1" dirty="0">
               <a:solidFill>
                 <a:srgbClr val="FF0000"/>
               </a:solidFill>
@@ -5342,7 +5165,7 @@
           </a:p>
           <a:p>
             <a:pPr lvl="1"/>
-            <a:endParaRPr lang="en-US" dirty="0" smtClean="0"/>
+            <a:endParaRPr lang="en-US" dirty="0"/>
           </a:p>
           <a:p>
             <a:endParaRPr lang="en-CA" dirty="0"/>
@@ -5432,41 +5255,25 @@
           <a:p>
             <a:r>
               <a:rPr lang="en-US" dirty="0"/>
-              <a:t>Types of SQL Statements in the OCCI </a:t>
-            </a:r>
-            <a:r>
-              <a:rPr lang="en-US" dirty="0" smtClean="0"/>
-              <a:t>Environment</a:t>
+              <a:t>Types of SQL Statements in the OCCI Environment</a:t>
             </a:r>
           </a:p>
           <a:p>
             <a:r>
               <a:rPr lang="en-CA" dirty="0"/>
-              <a:t>Executing SQL </a:t>
-            </a:r>
-            <a:r>
-              <a:rPr lang="en-CA" dirty="0" smtClean="0"/>
-              <a:t>Queries</a:t>
+              <a:t>Executing SQL Queries</a:t>
             </a:r>
           </a:p>
           <a:p>
             <a:r>
               <a:rPr lang="en-CA" dirty="0"/>
-              <a:t>Committing a </a:t>
-            </a:r>
-            <a:r>
-              <a:rPr lang="en-CA" dirty="0" smtClean="0"/>
-              <a:t>Transaction</a:t>
+              <a:t>Committing a Transaction</a:t>
             </a:r>
           </a:p>
           <a:p>
             <a:r>
               <a:rPr lang="en-CA" dirty="0"/>
-              <a:t>Handling </a:t>
-            </a:r>
-            <a:r>
-              <a:rPr lang="en-CA" dirty="0" smtClean="0"/>
-              <a:t>Exceptions</a:t>
+              <a:t>Handling Exceptions</a:t>
             </a:r>
           </a:p>
           <a:p>
@@ -5529,11 +5336,11 @@
           <a:lstStyle/>
           <a:p>
             <a:r>
-              <a:rPr lang="en-US" dirty="0" err="1" smtClean="0"/>
+              <a:rPr lang="en-US" dirty="0" err="1"/>
               <a:t>setSQL</a:t>
             </a:r>
             <a:r>
-              <a:rPr lang="en-US" dirty="0" smtClean="0"/>
+              <a:rPr lang="en-US" dirty="0"/>
               <a:t>( )</a:t>
             </a:r>
             <a:endParaRPr lang="en-CA" dirty="0"/>
@@ -5556,15 +5363,15 @@
           <a:lstStyle/>
           <a:p>
             <a:r>
-              <a:rPr lang="en-US" dirty="0" smtClean="0"/>
+              <a:rPr lang="en-US" dirty="0"/>
               <a:t>The </a:t>
             </a:r>
             <a:r>
-              <a:rPr lang="en-US" dirty="0" err="1" smtClean="0"/>
+              <a:rPr lang="en-US" dirty="0" err="1"/>
               <a:t>setSQL</a:t>
             </a:r>
             <a:r>
-              <a:rPr lang="en-US" dirty="0" smtClean="0"/>
+              <a:rPr lang="en-US" dirty="0"/>
               <a:t>() method is used to reuse a statement object to store and execute a SQL statement multiple times.</a:t>
             </a:r>
           </a:p>
@@ -5583,7 +5390,7 @@
               <a:t> </a:t>
             </a:r>
             <a:r>
-              <a:rPr lang="en-CA" dirty="0" err="1" smtClean="0">
+              <a:rPr lang="en-CA" dirty="0" err="1">
                 <a:solidFill>
                   <a:srgbClr val="FF0000"/>
                 </a:solidFill>
@@ -5632,33 +5439,33 @@
               </a:rPr>
               <a:t>);</a:t>
             </a:r>
-            <a:endParaRPr lang="en-US" dirty="0" smtClean="0"/>
-          </a:p>
-          <a:p>
-            <a:r>
-              <a:rPr lang="en-US" dirty="0" smtClean="0"/>
+            <a:endParaRPr lang="en-US" dirty="0"/>
+          </a:p>
+          <a:p>
+            <a:r>
+              <a:rPr lang="en-US" dirty="0"/>
               <a:t>The </a:t>
             </a:r>
             <a:r>
-              <a:rPr lang="en-US" dirty="0" err="1" smtClean="0"/>
+              <a:rPr lang="en-US" dirty="0" err="1"/>
               <a:t>getSQL</a:t>
             </a:r>
             <a:r>
-              <a:rPr lang="en-US" dirty="0" smtClean="0"/>
+              <a:rPr lang="en-US" dirty="0"/>
               <a:t>() method can be called to the content of the current statement.</a:t>
             </a:r>
           </a:p>
           <a:p>
             <a:r>
-              <a:rPr lang="en-US" dirty="0" smtClean="0"/>
+              <a:rPr lang="en-US" dirty="0"/>
               <a:t>To reset a statement object, call </a:t>
             </a:r>
             <a:r>
-              <a:rPr lang="en-US" dirty="0" err="1" smtClean="0"/>
+              <a:rPr lang="en-US" dirty="0" err="1"/>
               <a:t>serSQL</a:t>
             </a:r>
             <a:r>
-              <a:rPr lang="en-US" dirty="0" smtClean="0"/>
+              <a:rPr lang="en-US" dirty="0"/>
               <a:t>() method with the new SQL statement.</a:t>
             </a:r>
           </a:p>
@@ -5667,7 +5474,7 @@
               <a:buNone/>
             </a:pPr>
             <a:r>
-              <a:rPr lang="en-US" sz="1600" dirty="0" smtClean="0">
+              <a:rPr lang="en-US" sz="1600" dirty="0">
                 <a:solidFill>
                   <a:srgbClr val="FF0000"/>
                 </a:solidFill>
@@ -5677,7 +5484,7 @@
               <a:t> </a:t>
             </a:r>
             <a:r>
-              <a:rPr lang="en-US" sz="1600" dirty="0" err="1" smtClean="0">
+              <a:rPr lang="en-US" sz="1600" dirty="0" err="1">
                 <a:solidFill>
                   <a:srgbClr val="FF0000"/>
                 </a:solidFill>
@@ -5687,16 +5494,6 @@
               <a:t>stmt</a:t>
             </a:r>
             <a:r>
-              <a:rPr lang="en-US" sz="1600" dirty="0" smtClean="0">
-                <a:solidFill>
-                  <a:srgbClr val="FF0000"/>
-                </a:solidFill>
-                <a:latin typeface="Courier New" panose="02070309020205020404" pitchFamily="49" charset="0"/>
-                <a:cs typeface="Courier New" panose="02070309020205020404" pitchFamily="49" charset="0"/>
-              </a:rPr>
-              <a:t>-</a:t>
-            </a:r>
-            <a:r>
               <a:rPr lang="en-US" sz="1600" dirty="0">
                 <a:solidFill>
                   <a:srgbClr val="FF0000"/>
@@ -5704,7 +5501,7 @@
                 <a:latin typeface="Courier New" panose="02070309020205020404" pitchFamily="49" charset="0"/>
                 <a:cs typeface="Courier New" panose="02070309020205020404" pitchFamily="49" charset="0"/>
               </a:rPr>
-              <a:t>&gt;</a:t>
+              <a:t>-&gt;</a:t>
             </a:r>
             <a:r>
               <a:rPr lang="en-US" sz="1600" dirty="0" err="1">
@@ -5724,47 +5521,7 @@
                 <a:latin typeface="Courier New" panose="02070309020205020404" pitchFamily="49" charset="0"/>
                 <a:cs typeface="Courier New" panose="02070309020205020404" pitchFamily="49" charset="0"/>
               </a:rPr>
-              <a:t>("SELECT * FROM </a:t>
-            </a:r>
-            <a:r>
-              <a:rPr lang="en-US" sz="1600" dirty="0" smtClean="0">
-                <a:solidFill>
-                  <a:srgbClr val="FF0000"/>
-                </a:solidFill>
-                <a:latin typeface="Courier New" panose="02070309020205020404" pitchFamily="49" charset="0"/>
-                <a:cs typeface="Courier New" panose="02070309020205020404" pitchFamily="49" charset="0"/>
-              </a:rPr>
-              <a:t>inventories </a:t>
-            </a:r>
-            <a:r>
-              <a:rPr lang="en-US" sz="1600" dirty="0">
-                <a:solidFill>
-                  <a:srgbClr val="FF0000"/>
-                </a:solidFill>
-                <a:latin typeface="Courier New" panose="02070309020205020404" pitchFamily="49" charset="0"/>
-                <a:cs typeface="Courier New" panose="02070309020205020404" pitchFamily="49" charset="0"/>
-              </a:rPr>
-              <a:t>WHERE quantity &lt;</a:t>
-            </a:r>
-            <a:r>
-              <a:rPr lang="en-US" sz="1600" dirty="0" smtClean="0">
-                <a:solidFill>
-                  <a:srgbClr val="FF0000"/>
-                </a:solidFill>
-                <a:latin typeface="Courier New" panose="02070309020205020404" pitchFamily="49" charset="0"/>
-                <a:cs typeface="Courier New" panose="02070309020205020404" pitchFamily="49" charset="0"/>
-              </a:rPr>
-              <a:t> </a:t>
-            </a:r>
-            <a:r>
-              <a:rPr lang="en-US" sz="1600" dirty="0">
-                <a:solidFill>
-                  <a:srgbClr val="FF0000"/>
-                </a:solidFill>
-                <a:latin typeface="Courier New" panose="02070309020205020404" pitchFamily="49" charset="0"/>
-                <a:cs typeface="Courier New" panose="02070309020205020404" pitchFamily="49" charset="0"/>
-              </a:rPr>
-              <a:t>:1");</a:t>
+              <a:t>("SELECT * FROM inventories WHERE quantity &lt; :1");</a:t>
             </a:r>
           </a:p>
           <a:p>
@@ -5818,10 +5575,9 @@
           <a:lstStyle/>
           <a:p>
             <a:r>
-              <a:rPr lang="en-CA" dirty="0" smtClean="0"/>
+              <a:rPr lang="en-CA" dirty="0"/>
               <a:t>Parameterized Insert Statement</a:t>
             </a:r>
-            <a:endParaRPr lang="en-CA" dirty="0"/>
           </a:p>
         </p:txBody>
       </p:sp>
@@ -5900,7 +5656,7 @@
           <a:lstStyle/>
           <a:p>
             <a:r>
-              <a:rPr lang="en-US" dirty="0" smtClean="0"/>
+              <a:rPr lang="en-US" dirty="0"/>
               <a:t>Reset Statement Objects</a:t>
             </a:r>
             <a:endParaRPr lang="en-CA" dirty="0"/>
@@ -6046,16 +5802,12 @@
           <a:p>
             <a:r>
               <a:rPr lang="en-CA" dirty="0"/>
-              <a:t>PL/SQL stored </a:t>
-            </a:r>
-            <a:r>
-              <a:rPr lang="en-CA" dirty="0" smtClean="0"/>
-              <a:t>procedures are procedures stored on a database server which can be called inside a database or by an application.</a:t>
-            </a:r>
-          </a:p>
-          <a:p>
-            <a:r>
-              <a:rPr lang="en-US" dirty="0" smtClean="0"/>
+              <a:t>PL/SQL stored procedures are procedures stored on a database server which can be called inside a database or by an application.</a:t>
+            </a:r>
+          </a:p>
+          <a:p>
+            <a:r>
+              <a:rPr lang="en-US" dirty="0"/>
               <a:t>First define the statement to be executed:</a:t>
             </a:r>
           </a:p>
@@ -6104,7 +5856,7 @@
               <a:t>("BEGIN </a:t>
             </a:r>
             <a:r>
-              <a:rPr lang="en-US" dirty="0" err="1" smtClean="0">
+              <a:rPr lang="en-US" dirty="0" err="1">
                 <a:solidFill>
                   <a:srgbClr val="FF0000"/>
                 </a:solidFill>
@@ -6114,16 +5866,6 @@
               <a:t>countStudents</a:t>
             </a:r>
             <a:r>
-              <a:rPr lang="en-US" dirty="0" smtClean="0">
-                <a:solidFill>
-                  <a:srgbClr val="FF0000"/>
-                </a:solidFill>
-                <a:latin typeface="Courier New" panose="02070309020205020404" pitchFamily="49" charset="0"/>
-                <a:cs typeface="Courier New" panose="02070309020205020404" pitchFamily="49" charset="0"/>
-              </a:rPr>
-              <a:t>(:</a:t>
-            </a:r>
-            <a:r>
               <a:rPr lang="en-US" dirty="0">
                 <a:solidFill>
                   <a:srgbClr val="FF0000"/>
@@ -6131,54 +5873,44 @@
                 <a:latin typeface="Courier New" panose="02070309020205020404" pitchFamily="49" charset="0"/>
                 <a:cs typeface="Courier New" panose="02070309020205020404" pitchFamily="49" charset="0"/>
               </a:rPr>
-              <a:t>1, :2); END</a:t>
-            </a:r>
-            <a:r>
-              <a:rPr lang="en-US" dirty="0" smtClean="0">
-                <a:solidFill>
-                  <a:srgbClr val="FF0000"/>
-                </a:solidFill>
-                <a:latin typeface="Courier New" panose="02070309020205020404" pitchFamily="49" charset="0"/>
-                <a:cs typeface="Courier New" panose="02070309020205020404" pitchFamily="49" charset="0"/>
-              </a:rPr>
-              <a:t>:");</a:t>
+              <a:t>(:1, :2); END:");</a:t>
             </a:r>
           </a:p>
           <a:p>
             <a:pPr lvl="1"/>
             <a:r>
-              <a:rPr lang="en-US" dirty="0" smtClean="0"/>
+              <a:rPr lang="en-US" dirty="0"/>
               <a:t>The above command will call </a:t>
             </a:r>
             <a:r>
-              <a:rPr lang="en-US" smtClean="0"/>
+              <a:rPr lang="en-US"/>
               <a:t>the </a:t>
             </a:r>
             <a:r>
-              <a:rPr lang="en-US" i="1" smtClean="0"/>
+              <a:rPr lang="en-US" i="1"/>
               <a:t>countStudents</a:t>
             </a:r>
             <a:r>
-              <a:rPr lang="en-US" smtClean="0"/>
+              <a:rPr lang="en-US"/>
               <a:t> </a:t>
             </a:r>
             <a:r>
-              <a:rPr lang="en-US" dirty="0" smtClean="0"/>
+              <a:rPr lang="en-US" dirty="0"/>
               <a:t>stored procedure that has two parameters.</a:t>
             </a:r>
           </a:p>
           <a:p>
             <a:pPr lvl="1"/>
             <a:r>
-              <a:rPr lang="en-US" dirty="0" smtClean="0"/>
+              <a:rPr lang="en-US" dirty="0"/>
               <a:t>First parameter is an </a:t>
             </a:r>
             <a:r>
-              <a:rPr lang="en-US" i="1" dirty="0" smtClean="0"/>
+              <a:rPr lang="en-US" i="1" dirty="0"/>
               <a:t>IN</a:t>
             </a:r>
             <a:r>
-              <a:rPr lang="en-US" dirty="0" smtClean="0"/>
+              <a:rPr lang="en-US" dirty="0"/>
               <a:t> parameter. It gets the value of PGM (program). The stored procedure will then find the number of students in the “CPA” program.</a:t>
             </a:r>
           </a:p>
@@ -6187,7 +5919,7 @@
               <a:buNone/>
             </a:pPr>
             <a:r>
-              <a:rPr lang="en-CA" dirty="0" err="1" smtClean="0">
+              <a:rPr lang="en-CA" dirty="0" err="1">
                 <a:solidFill>
                   <a:srgbClr val="FF0000"/>
                 </a:solidFill>
@@ -6197,7 +5929,7 @@
               <a:t>stmt</a:t>
             </a:r>
             <a:r>
-              <a:rPr lang="en-CA" dirty="0" smtClean="0">
+              <a:rPr lang="en-CA" dirty="0">
                 <a:solidFill>
                   <a:srgbClr val="FF0000"/>
                 </a:solidFill>
@@ -6207,7 +5939,7 @@
               <a:t>-&gt;</a:t>
             </a:r>
             <a:r>
-              <a:rPr lang="en-CA" dirty="0" err="1" smtClean="0">
+              <a:rPr lang="en-CA" dirty="0" err="1">
                 <a:solidFill>
                   <a:srgbClr val="FF0000"/>
                 </a:solidFill>
@@ -6217,16 +5949,6 @@
               <a:t>setString</a:t>
             </a:r>
             <a:r>
-              <a:rPr lang="en-CA" dirty="0" smtClean="0">
-                <a:solidFill>
-                  <a:srgbClr val="FF0000"/>
-                </a:solidFill>
-                <a:latin typeface="Courier New" panose="02070309020205020404" pitchFamily="49" charset="0"/>
-                <a:cs typeface="Courier New" panose="02070309020205020404" pitchFamily="49" charset="0"/>
-              </a:rPr>
-              <a:t>(1, </a:t>
-            </a:r>
-            <a:r>
               <a:rPr lang="en-CA" dirty="0">
                 <a:solidFill>
                   <a:srgbClr val="FF0000"/>
@@ -6234,31 +5956,21 @@
                 <a:latin typeface="Courier New" panose="02070309020205020404" pitchFamily="49" charset="0"/>
                 <a:cs typeface="Courier New" panose="02070309020205020404" pitchFamily="49" charset="0"/>
               </a:rPr>
-              <a:t>"</a:t>
-            </a:r>
-            <a:r>
-              <a:rPr lang="en-CA" dirty="0" smtClean="0">
-                <a:solidFill>
-                  <a:srgbClr val="FF0000"/>
-                </a:solidFill>
-                <a:latin typeface="Courier New" panose="02070309020205020404" pitchFamily="49" charset="0"/>
-                <a:cs typeface="Courier New" panose="02070309020205020404" pitchFamily="49" charset="0"/>
-              </a:rPr>
-              <a:t>CPA");</a:t>
+              <a:t>(1, "CPA");</a:t>
             </a:r>
           </a:p>
           <a:p>
             <a:pPr lvl="1"/>
             <a:r>
-              <a:rPr lang="en-US" dirty="0" smtClean="0"/>
+              <a:rPr lang="en-US" dirty="0"/>
               <a:t>The second parameter is an </a:t>
             </a:r>
             <a:r>
-              <a:rPr lang="en-US" i="1" dirty="0" smtClean="0"/>
+              <a:rPr lang="en-US" i="1" dirty="0"/>
               <a:t>OUT</a:t>
             </a:r>
             <a:r>
-              <a:rPr lang="en-US" dirty="0" smtClean="0"/>
+              <a:rPr lang="en-US" dirty="0"/>
               <a:t> parameter. It stored the number of students in the  “CPA” program and the values will be returned to the caller. </a:t>
             </a:r>
           </a:p>
@@ -6267,7 +5979,7 @@
               <a:buNone/>
             </a:pPr>
             <a:r>
-              <a:rPr lang="en-US" dirty="0" err="1" smtClean="0">
+              <a:rPr lang="en-US" dirty="0" err="1">
                 <a:solidFill>
                   <a:srgbClr val="FF0000"/>
                 </a:solidFill>
@@ -6277,7 +5989,7 @@
               <a:t>int</a:t>
             </a:r>
             <a:r>
-              <a:rPr lang="en-US" dirty="0" smtClean="0">
+              <a:rPr lang="en-US" dirty="0">
                 <a:solidFill>
                   <a:srgbClr val="FF0000"/>
                 </a:solidFill>
@@ -6287,7 +5999,7 @@
               <a:t> count;  </a:t>
             </a:r>
             <a:r>
-              <a:rPr lang="en-US" dirty="0" smtClean="0">
+              <a:rPr lang="en-US" dirty="0">
                 <a:solidFill>
                   <a:schemeClr val="tx1">
                     <a:lumMod val="50000"/>
@@ -6300,7 +6012,7 @@
               <a:t>// this variable stores the returning value from the </a:t>
             </a:r>
             <a:r>
-              <a:rPr lang="en-US" dirty="0" err="1" smtClean="0">
+              <a:rPr lang="en-US" dirty="0" err="1">
                 <a:solidFill>
                   <a:schemeClr val="tx1">
                     <a:lumMod val="50000"/>
@@ -6313,7 +6025,7 @@
               <a:t>countStudent</a:t>
             </a:r>
             <a:r>
-              <a:rPr lang="en-US" dirty="0" smtClean="0">
+              <a:rPr lang="en-US" dirty="0">
                 <a:solidFill>
                   <a:schemeClr val="tx1">
                     <a:lumMod val="50000"/>
@@ -6371,7 +6083,7 @@
               <a:t>(2, Type::OCCIINT, </a:t>
             </a:r>
             <a:r>
-              <a:rPr lang="en-CA" dirty="0" err="1" smtClean="0">
+              <a:rPr lang="en-CA" dirty="0" err="1">
                 <a:solidFill>
                   <a:srgbClr val="FF0000"/>
                 </a:solidFill>
@@ -6381,7 +6093,7 @@
               <a:t>sizeof</a:t>
             </a:r>
             <a:r>
-              <a:rPr lang="en-CA" dirty="0" smtClean="0">
+              <a:rPr lang="en-CA" dirty="0">
                 <a:solidFill>
                   <a:srgbClr val="FF0000"/>
                 </a:solidFill>
@@ -6391,7 +6103,7 @@
               <a:t>(count)); </a:t>
             </a:r>
             <a:br>
-              <a:rPr lang="en-CA" dirty="0" smtClean="0">
+              <a:rPr lang="en-CA" dirty="0">
                 <a:solidFill>
                   <a:srgbClr val="FF0000"/>
                 </a:solidFill>
@@ -6400,7 +6112,7 @@
               </a:rPr>
             </a:br>
             <a:r>
-              <a:rPr lang="en-US" dirty="0" smtClean="0">
+              <a:rPr lang="en-US" dirty="0">
                 <a:solidFill>
                   <a:schemeClr val="tx1">
                     <a:lumMod val="50000"/>
@@ -6410,33 +6122,7 @@
                 <a:latin typeface="Courier New" panose="02070309020205020404" pitchFamily="49" charset="0"/>
                 <a:cs typeface="Courier New" panose="02070309020205020404" pitchFamily="49" charset="0"/>
               </a:rPr>
-              <a:t>// </a:t>
-            </a:r>
-            <a:r>
-              <a:rPr lang="en-US" dirty="0">
-                <a:solidFill>
-                  <a:schemeClr val="tx1">
-                    <a:lumMod val="50000"/>
-                    <a:lumOff val="50000"/>
-                  </a:schemeClr>
-                </a:solidFill>
-                <a:latin typeface="Courier New" panose="02070309020205020404" pitchFamily="49" charset="0"/>
-                <a:cs typeface="Courier New" panose="02070309020205020404" pitchFamily="49" charset="0"/>
-              </a:rPr>
-              <a:t>specify type and size of the second (OUT) </a:t>
-            </a:r>
-            <a:r>
-              <a:rPr lang="en-US" dirty="0" smtClean="0">
-                <a:solidFill>
-                  <a:schemeClr val="tx1">
-                    <a:lumMod val="50000"/>
-                    <a:lumOff val="50000"/>
-                  </a:schemeClr>
-                </a:solidFill>
-                <a:latin typeface="Courier New" panose="02070309020205020404" pitchFamily="49" charset="0"/>
-                <a:cs typeface="Courier New" panose="02070309020205020404" pitchFamily="49" charset="0"/>
-              </a:rPr>
-              <a:t>parameter</a:t>
+              <a:t>// specify type and size of the second (OUT) parameter</a:t>
             </a:r>
             <a:endParaRPr lang="en-CA" dirty="0">
               <a:solidFill>
@@ -6452,7 +6138,7 @@
           <a:p>
             <a:pPr lvl="1"/>
             <a:r>
-              <a:rPr lang="en-US" dirty="0" smtClean="0"/>
+              <a:rPr lang="en-US" dirty="0"/>
               <a:t>And finally, execute the statement to call and execute the stored procedure.</a:t>
             </a:r>
           </a:p>
@@ -6498,23 +6184,13 @@
                 <a:latin typeface="Courier New" panose="02070309020205020404" pitchFamily="49" charset="0"/>
                 <a:cs typeface="Courier New" panose="02070309020205020404" pitchFamily="49" charset="0"/>
               </a:rPr>
-              <a:t>(); // call the </a:t>
-            </a:r>
-            <a:r>
-              <a:rPr lang="en-US" dirty="0" smtClean="0">
-                <a:solidFill>
-                  <a:srgbClr val="FF0000"/>
-                </a:solidFill>
-                <a:latin typeface="Courier New" panose="02070309020205020404" pitchFamily="49" charset="0"/>
-                <a:cs typeface="Courier New" panose="02070309020205020404" pitchFamily="49" charset="0"/>
-              </a:rPr>
-              <a:t>procedure</a:t>
+              <a:t>(); // call the procedure</a:t>
             </a:r>
           </a:p>
           <a:p>
             <a:pPr lvl="1"/>
             <a:r>
-              <a:rPr lang="en-US" dirty="0" smtClean="0"/>
+              <a:rPr lang="en-US" dirty="0"/>
               <a:t>Now, save the returning value of the OUT parameter in the count variable.</a:t>
             </a:r>
           </a:p>
@@ -6523,16 +6199,6 @@
               <a:buNone/>
             </a:pPr>
             <a:r>
-              <a:rPr lang="en-CA" dirty="0" smtClean="0">
-                <a:solidFill>
-                  <a:srgbClr val="FF0000"/>
-                </a:solidFill>
-                <a:latin typeface="Courier New" panose="02070309020205020404" pitchFamily="49" charset="0"/>
-                <a:cs typeface="Courier New" panose="02070309020205020404" pitchFamily="49" charset="0"/>
-              </a:rPr>
-              <a:t>count </a:t>
-            </a:r>
-            <a:r>
               <a:rPr lang="en-CA" dirty="0">
                 <a:solidFill>
                   <a:srgbClr val="FF0000"/>
@@ -6540,7 +6206,7 @@
                 <a:latin typeface="Courier New" panose="02070309020205020404" pitchFamily="49" charset="0"/>
                 <a:cs typeface="Courier New" panose="02070309020205020404" pitchFamily="49" charset="0"/>
               </a:rPr>
-              <a:t>= </a:t>
+              <a:t>count = </a:t>
             </a:r>
             <a:r>
               <a:rPr lang="en-CA" dirty="0" err="1">
@@ -6655,19 +6321,19 @@
           <a:lstStyle/>
           <a:p>
             <a:r>
-              <a:rPr lang="en-US" dirty="0" smtClean="0"/>
+              <a:rPr lang="en-US" dirty="0"/>
               <a:t>An application fetch information from a database by executing SQL queries.</a:t>
             </a:r>
           </a:p>
           <a:p>
             <a:r>
-              <a:rPr lang="en-US" dirty="0" smtClean="0"/>
+              <a:rPr lang="en-US" dirty="0"/>
               <a:t>You can execute a query and store a result into a result set object.</a:t>
             </a:r>
           </a:p>
           <a:p>
             <a:r>
-              <a:rPr lang="en-US" dirty="0" smtClean="0"/>
+              <a:rPr lang="en-US" dirty="0"/>
               <a:t>See the following example:</a:t>
             </a:r>
           </a:p>
@@ -6753,31 +6419,21 @@
                 <a:latin typeface="Courier New" panose="02070309020205020404" pitchFamily="49" charset="0"/>
                 <a:cs typeface="Courier New" panose="02070309020205020404" pitchFamily="49" charset="0"/>
               </a:rPr>
-              <a:t>("SELECT * FROM </a:t>
-            </a:r>
-            <a:r>
-              <a:rPr lang="en-US" sz="1400" dirty="0" smtClean="0">
-                <a:solidFill>
-                  <a:srgbClr val="FF0000"/>
-                </a:solidFill>
-                <a:latin typeface="Courier New" panose="02070309020205020404" pitchFamily="49" charset="0"/>
-                <a:cs typeface="Courier New" panose="02070309020205020404" pitchFamily="49" charset="0"/>
-              </a:rPr>
-              <a:t>student");</a:t>
+              <a:t>("SELECT * FROM student");</a:t>
             </a:r>
           </a:p>
           <a:p>
             <a:pPr lvl="1"/>
             <a:r>
-              <a:rPr lang="en-US" dirty="0" smtClean="0"/>
+              <a:rPr lang="en-US" dirty="0"/>
               <a:t>The result of the above query is stored in </a:t>
             </a:r>
             <a:r>
-              <a:rPr lang="en-US" i="1" dirty="0" err="1" smtClean="0"/>
+              <a:rPr lang="en-US" i="1" dirty="0" err="1"/>
               <a:t>rs</a:t>
             </a:r>
             <a:r>
-              <a:rPr lang="en-US" dirty="0" smtClean="0"/>
+              <a:rPr lang="en-US" dirty="0"/>
               <a:t>.</a:t>
             </a:r>
           </a:p>
@@ -6803,17 +6459,17 @@
                 <a:latin typeface="Courier New" panose="02070309020205020404" pitchFamily="49" charset="0"/>
                 <a:cs typeface="Courier New" panose="02070309020205020404" pitchFamily="49" charset="0"/>
               </a:rPr>
-              <a:t> &lt;&lt; "The </a:t>
-            </a:r>
-            <a:r>
-              <a:rPr lang="en-US" sz="1400" dirty="0" smtClean="0">
-                <a:solidFill>
-                  <a:srgbClr val="FF0000"/>
-                </a:solidFill>
-                <a:latin typeface="Courier New" panose="02070309020205020404" pitchFamily="49" charset="0"/>
-                <a:cs typeface="Courier New" panose="02070309020205020404" pitchFamily="49" charset="0"/>
-              </a:rPr>
-              <a:t>CPA program has</a:t>
+              <a:t> &lt;&lt; "The CPA program has:" &lt;&lt; </a:t>
+            </a:r>
+            <a:r>
+              <a:rPr lang="en-US" sz="1400" dirty="0" err="1">
+                <a:solidFill>
+                  <a:srgbClr val="FF0000"/>
+                </a:solidFill>
+                <a:latin typeface="Courier New" panose="02070309020205020404" pitchFamily="49" charset="0"/>
+                <a:cs typeface="Courier New" panose="02070309020205020404" pitchFamily="49" charset="0"/>
+              </a:rPr>
+              <a:t>endl</a:t>
             </a:r>
             <a:r>
               <a:rPr lang="en-US" sz="1400" dirty="0">
@@ -6823,8 +6479,63 @@
                 <a:latin typeface="Courier New" panose="02070309020205020404" pitchFamily="49" charset="0"/>
                 <a:cs typeface="Courier New" panose="02070309020205020404" pitchFamily="49" charset="0"/>
               </a:rPr>
-              <a:t>:" &lt;&lt; </a:t>
-            </a:r>
+              <a:t>;</a:t>
+            </a:r>
+          </a:p>
+          <a:p>
+            <a:pPr marL="274320" lvl="1" indent="0">
+              <a:buNone/>
+            </a:pPr>
+            <a:r>
+              <a:rPr lang="en-CA" sz="1400" dirty="0">
+                <a:solidFill>
+                  <a:srgbClr val="FF0000"/>
+                </a:solidFill>
+                <a:latin typeface="Courier New" panose="02070309020205020404" pitchFamily="49" charset="0"/>
+                <a:cs typeface="Courier New" panose="02070309020205020404" pitchFamily="49" charset="0"/>
+              </a:rPr>
+              <a:t>while (</a:t>
+            </a:r>
+            <a:r>
+              <a:rPr lang="en-CA" sz="1400" dirty="0" err="1">
+                <a:solidFill>
+                  <a:srgbClr val="FF0000"/>
+                </a:solidFill>
+                <a:latin typeface="Courier New" panose="02070309020205020404" pitchFamily="49" charset="0"/>
+                <a:cs typeface="Courier New" panose="02070309020205020404" pitchFamily="49" charset="0"/>
+              </a:rPr>
+              <a:t>rs</a:t>
+            </a:r>
+            <a:r>
+              <a:rPr lang="en-CA" sz="1400" dirty="0">
+                <a:solidFill>
+                  <a:srgbClr val="FF0000"/>
+                </a:solidFill>
+                <a:latin typeface="Courier New" panose="02070309020205020404" pitchFamily="49" charset="0"/>
+                <a:cs typeface="Courier New" panose="02070309020205020404" pitchFamily="49" charset="0"/>
+              </a:rPr>
+              <a:t>-&gt;next())</a:t>
+            </a:r>
+          </a:p>
+          <a:p>
+            <a:pPr marL="274320" lvl="1" indent="0">
+              <a:buNone/>
+            </a:pPr>
+            <a:r>
+              <a:rPr lang="en-CA" sz="1400" dirty="0">
+                <a:solidFill>
+                  <a:srgbClr val="FF0000"/>
+                </a:solidFill>
+                <a:latin typeface="Courier New" panose="02070309020205020404" pitchFamily="49" charset="0"/>
+                <a:cs typeface="Courier New" panose="02070309020205020404" pitchFamily="49" charset="0"/>
+              </a:rPr>
+              <a:t>{</a:t>
+            </a:r>
+          </a:p>
+          <a:p>
+            <a:pPr marL="274320" lvl="1" indent="0">
+              <a:buNone/>
+            </a:pPr>
             <a:r>
               <a:rPr lang="en-US" sz="1400" dirty="0" err="1">
                 <a:solidFill>
@@ -6833,7 +6544,7 @@
                 <a:latin typeface="Courier New" panose="02070309020205020404" pitchFamily="49" charset="0"/>
                 <a:cs typeface="Courier New" panose="02070309020205020404" pitchFamily="49" charset="0"/>
               </a:rPr>
-              <a:t>endl</a:t>
+              <a:t>int</a:t>
             </a:r>
             <a:r>
               <a:rPr lang="en-US" sz="1400" dirty="0">
@@ -6843,25 +6554,10 @@
                 <a:latin typeface="Courier New" panose="02070309020205020404" pitchFamily="49" charset="0"/>
                 <a:cs typeface="Courier New" panose="02070309020205020404" pitchFamily="49" charset="0"/>
               </a:rPr>
-              <a:t>;</a:t>
-            </a:r>
-          </a:p>
-          <a:p>
-            <a:pPr marL="274320" lvl="1" indent="0">
-              <a:buNone/>
-            </a:pPr>
-            <a:r>
-              <a:rPr lang="en-CA" sz="1400" dirty="0">
-                <a:solidFill>
-                  <a:srgbClr val="FF0000"/>
-                </a:solidFill>
-                <a:latin typeface="Courier New" panose="02070309020205020404" pitchFamily="49" charset="0"/>
-                <a:cs typeface="Courier New" panose="02070309020205020404" pitchFamily="49" charset="0"/>
-              </a:rPr>
-              <a:t>while (</a:t>
-            </a:r>
-            <a:r>
-              <a:rPr lang="en-CA" sz="1400" dirty="0" err="1">
+              <a:t> count = </a:t>
+            </a:r>
+            <a:r>
+              <a:rPr lang="en-US" sz="1400" dirty="0" err="1">
                 <a:solidFill>
                   <a:srgbClr val="FF0000"/>
                 </a:solidFill>
@@ -6871,35 +6567,15 @@
               <a:t>rs</a:t>
             </a:r>
             <a:r>
-              <a:rPr lang="en-CA" sz="1400" dirty="0">
-                <a:solidFill>
-                  <a:srgbClr val="FF0000"/>
-                </a:solidFill>
-                <a:latin typeface="Courier New" panose="02070309020205020404" pitchFamily="49" charset="0"/>
-                <a:cs typeface="Courier New" panose="02070309020205020404" pitchFamily="49" charset="0"/>
-              </a:rPr>
-              <a:t>-&gt;next())</a:t>
-            </a:r>
-          </a:p>
-          <a:p>
-            <a:pPr marL="274320" lvl="1" indent="0">
-              <a:buNone/>
-            </a:pPr>
-            <a:r>
-              <a:rPr lang="en-CA" sz="1400" dirty="0" smtClean="0">
-                <a:solidFill>
-                  <a:srgbClr val="FF0000"/>
-                </a:solidFill>
-                <a:latin typeface="Courier New" panose="02070309020205020404" pitchFamily="49" charset="0"/>
-                <a:cs typeface="Courier New" panose="02070309020205020404" pitchFamily="49" charset="0"/>
-              </a:rPr>
-              <a:t>{</a:t>
-            </a:r>
-          </a:p>
-          <a:p>
-            <a:pPr marL="274320" lvl="1" indent="0">
-              <a:buNone/>
-            </a:pPr>
+              <a:rPr lang="en-US" sz="1400" dirty="0">
+                <a:solidFill>
+                  <a:srgbClr val="FF0000"/>
+                </a:solidFill>
+                <a:latin typeface="Courier New" panose="02070309020205020404" pitchFamily="49" charset="0"/>
+                <a:cs typeface="Courier New" panose="02070309020205020404" pitchFamily="49" charset="0"/>
+              </a:rPr>
+              <a:t>-&gt;</a:t>
+            </a:r>
             <a:r>
               <a:rPr lang="en-US" sz="1400" dirty="0" err="1">
                 <a:solidFill>
@@ -6908,7 +6584,7 @@
                 <a:latin typeface="Courier New" panose="02070309020205020404" pitchFamily="49" charset="0"/>
                 <a:cs typeface="Courier New" panose="02070309020205020404" pitchFamily="49" charset="0"/>
               </a:rPr>
-              <a:t>int</a:t>
+              <a:t>getInt</a:t>
             </a:r>
             <a:r>
               <a:rPr lang="en-US" sz="1400" dirty="0">
@@ -6918,77 +6594,7 @@
                 <a:latin typeface="Courier New" panose="02070309020205020404" pitchFamily="49" charset="0"/>
                 <a:cs typeface="Courier New" panose="02070309020205020404" pitchFamily="49" charset="0"/>
               </a:rPr>
-              <a:t> count = </a:t>
-            </a:r>
-            <a:r>
-              <a:rPr lang="en-US" sz="1400" dirty="0" err="1">
-                <a:solidFill>
-                  <a:srgbClr val="FF0000"/>
-                </a:solidFill>
-                <a:latin typeface="Courier New" panose="02070309020205020404" pitchFamily="49" charset="0"/>
-                <a:cs typeface="Courier New" panose="02070309020205020404" pitchFamily="49" charset="0"/>
-              </a:rPr>
-              <a:t>rs</a:t>
-            </a:r>
-            <a:r>
-              <a:rPr lang="en-US" sz="1400" dirty="0">
-                <a:solidFill>
-                  <a:srgbClr val="FF0000"/>
-                </a:solidFill>
-                <a:latin typeface="Courier New" panose="02070309020205020404" pitchFamily="49" charset="0"/>
-                <a:cs typeface="Courier New" panose="02070309020205020404" pitchFamily="49" charset="0"/>
-              </a:rPr>
-              <a:t>-&gt;</a:t>
-            </a:r>
-            <a:r>
-              <a:rPr lang="en-US" sz="1400" dirty="0" err="1" smtClean="0">
-                <a:solidFill>
-                  <a:srgbClr val="FF0000"/>
-                </a:solidFill>
-                <a:latin typeface="Courier New" panose="02070309020205020404" pitchFamily="49" charset="0"/>
-                <a:cs typeface="Courier New" panose="02070309020205020404" pitchFamily="49" charset="0"/>
-              </a:rPr>
-              <a:t>getInt</a:t>
-            </a:r>
-            <a:r>
-              <a:rPr lang="en-US" sz="1400" dirty="0" smtClean="0">
-                <a:solidFill>
-                  <a:srgbClr val="FF0000"/>
-                </a:solidFill>
-                <a:latin typeface="Courier New" panose="02070309020205020404" pitchFamily="49" charset="0"/>
-                <a:cs typeface="Courier New" panose="02070309020205020404" pitchFamily="49" charset="0"/>
-              </a:rPr>
-              <a:t>(1); </a:t>
-            </a:r>
-            <a:r>
-              <a:rPr lang="en-US" sz="1400" dirty="0">
-                <a:solidFill>
-                  <a:srgbClr val="FF0000"/>
-                </a:solidFill>
-                <a:latin typeface="Courier New" panose="02070309020205020404" pitchFamily="49" charset="0"/>
-                <a:cs typeface="Courier New" panose="02070309020205020404" pitchFamily="49" charset="0"/>
-              </a:rPr>
-              <a:t>// get the </a:t>
-            </a:r>
-            <a:r>
-              <a:rPr lang="en-US" sz="1400" dirty="0" smtClean="0">
-                <a:solidFill>
-                  <a:srgbClr val="FF0000"/>
-                </a:solidFill>
-                <a:latin typeface="Courier New" panose="02070309020205020404" pitchFamily="49" charset="0"/>
-                <a:cs typeface="Courier New" panose="02070309020205020404" pitchFamily="49" charset="0"/>
-              </a:rPr>
-              <a:t>first </a:t>
-            </a:r>
-            <a:r>
-              <a:rPr lang="en-US" sz="1400" dirty="0">
-                <a:solidFill>
-                  <a:srgbClr val="FF0000"/>
-                </a:solidFill>
-                <a:latin typeface="Courier New" panose="02070309020205020404" pitchFamily="49" charset="0"/>
-                <a:cs typeface="Courier New" panose="02070309020205020404" pitchFamily="49" charset="0"/>
-              </a:rPr>
-              <a:t>column as </a:t>
+              <a:t>(1); // get the first column as </a:t>
             </a:r>
             <a:r>
               <a:rPr lang="en-US" sz="1400" dirty="0" err="1">
@@ -7020,17 +6626,17 @@
                 <a:latin typeface="Courier New" panose="02070309020205020404" pitchFamily="49" charset="0"/>
                 <a:cs typeface="Courier New" panose="02070309020205020404" pitchFamily="49" charset="0"/>
               </a:rPr>
-              <a:t>string </a:t>
-            </a:r>
-            <a:r>
-              <a:rPr lang="en-US" sz="1400" dirty="0" smtClean="0">
-                <a:solidFill>
-                  <a:srgbClr val="FF0000"/>
-                </a:solidFill>
-                <a:latin typeface="Courier New" panose="02070309020205020404" pitchFamily="49" charset="0"/>
-                <a:cs typeface="Courier New" panose="02070309020205020404" pitchFamily="49" charset="0"/>
-              </a:rPr>
-              <a:t>name </a:t>
+              <a:t>string name = </a:t>
+            </a:r>
+            <a:r>
+              <a:rPr lang="en-US" sz="1400" dirty="0" err="1">
+                <a:solidFill>
+                  <a:srgbClr val="FF0000"/>
+                </a:solidFill>
+                <a:latin typeface="Courier New" panose="02070309020205020404" pitchFamily="49" charset="0"/>
+                <a:cs typeface="Courier New" panose="02070309020205020404" pitchFamily="49" charset="0"/>
+              </a:rPr>
+              <a:t>rs</a:t>
             </a:r>
             <a:r>
               <a:rPr lang="en-US" sz="1400" dirty="0">
@@ -7040,7 +6646,7 @@
                 <a:latin typeface="Courier New" panose="02070309020205020404" pitchFamily="49" charset="0"/>
                 <a:cs typeface="Courier New" panose="02070309020205020404" pitchFamily="49" charset="0"/>
               </a:rPr>
-              <a:t>= </a:t>
+              <a:t>-&gt;</a:t>
             </a:r>
             <a:r>
               <a:rPr lang="en-US" sz="1400" dirty="0" err="1">
@@ -7050,7 +6656,7 @@
                 <a:latin typeface="Courier New" panose="02070309020205020404" pitchFamily="49" charset="0"/>
                 <a:cs typeface="Courier New" panose="02070309020205020404" pitchFamily="49" charset="0"/>
               </a:rPr>
-              <a:t>rs</a:t>
+              <a:t>getString</a:t>
             </a:r>
             <a:r>
               <a:rPr lang="en-US" sz="1400" dirty="0">
@@ -7060,75 +6666,8 @@
                 <a:latin typeface="Courier New" panose="02070309020205020404" pitchFamily="49" charset="0"/>
                 <a:cs typeface="Courier New" panose="02070309020205020404" pitchFamily="49" charset="0"/>
               </a:rPr>
-              <a:t>-&gt;</a:t>
-            </a:r>
-            <a:r>
-              <a:rPr lang="en-US" sz="1400" dirty="0" err="1" smtClean="0">
-                <a:solidFill>
-                  <a:srgbClr val="FF0000"/>
-                </a:solidFill>
-                <a:latin typeface="Courier New" panose="02070309020205020404" pitchFamily="49" charset="0"/>
-                <a:cs typeface="Courier New" panose="02070309020205020404" pitchFamily="49" charset="0"/>
-              </a:rPr>
-              <a:t>getString</a:t>
-            </a:r>
-            <a:r>
-              <a:rPr lang="en-US" sz="1400" dirty="0" smtClean="0">
-                <a:solidFill>
-                  <a:srgbClr val="FF0000"/>
-                </a:solidFill>
-                <a:latin typeface="Courier New" panose="02070309020205020404" pitchFamily="49" charset="0"/>
-                <a:cs typeface="Courier New" panose="02070309020205020404" pitchFamily="49" charset="0"/>
-              </a:rPr>
-              <a:t>(2); </a:t>
-            </a:r>
-            <a:r>
-              <a:rPr lang="en-US" sz="1400" dirty="0">
-                <a:solidFill>
-                  <a:srgbClr val="FF0000"/>
-                </a:solidFill>
-                <a:latin typeface="Courier New" panose="02070309020205020404" pitchFamily="49" charset="0"/>
-                <a:cs typeface="Courier New" panose="02070309020205020404" pitchFamily="49" charset="0"/>
-              </a:rPr>
-              <a:t>// get the </a:t>
-            </a:r>
-            <a:r>
-              <a:rPr lang="en-US" sz="1400" dirty="0" smtClean="0">
-                <a:solidFill>
-                  <a:srgbClr val="FF0000"/>
-                </a:solidFill>
-                <a:latin typeface="Courier New" panose="02070309020205020404" pitchFamily="49" charset="0"/>
-                <a:cs typeface="Courier New" panose="02070309020205020404" pitchFamily="49" charset="0"/>
-              </a:rPr>
-              <a:t>second </a:t>
-            </a:r>
-            <a:r>
-              <a:rPr lang="en-US" sz="1400" dirty="0">
-                <a:solidFill>
-                  <a:srgbClr val="FF0000"/>
-                </a:solidFill>
-                <a:latin typeface="Courier New" panose="02070309020205020404" pitchFamily="49" charset="0"/>
-                <a:cs typeface="Courier New" panose="02070309020205020404" pitchFamily="49" charset="0"/>
-              </a:rPr>
-              <a:t>column as </a:t>
-            </a:r>
-            <a:r>
-              <a:rPr lang="en-US" sz="1400" dirty="0" smtClean="0">
-                <a:solidFill>
-                  <a:srgbClr val="FF0000"/>
-                </a:solidFill>
-                <a:latin typeface="Courier New" panose="02070309020205020404" pitchFamily="49" charset="0"/>
-                <a:cs typeface="Courier New" panose="02070309020205020404" pitchFamily="49" charset="0"/>
-              </a:rPr>
-              <a:t>string</a:t>
-            </a:r>
-            <a:endParaRPr lang="en-US" sz="1400" dirty="0">
-              <a:solidFill>
-                <a:srgbClr val="FF0000"/>
-              </a:solidFill>
-              <a:latin typeface="Courier New" panose="02070309020205020404" pitchFamily="49" charset="0"/>
-              <a:cs typeface="Courier New" panose="02070309020205020404" pitchFamily="49" charset="0"/>
-            </a:endParaRPr>
+              <a:t>(2); // get the second column as string</a:t>
+            </a:r>
           </a:p>
           <a:p>
             <a:pPr marL="274320" lvl="1" indent="0">
@@ -7152,17 +6691,17 @@
                 <a:latin typeface="Courier New" panose="02070309020205020404" pitchFamily="49" charset="0"/>
                 <a:cs typeface="Courier New" panose="02070309020205020404" pitchFamily="49" charset="0"/>
               </a:rPr>
-              <a:t> &lt;&lt; </a:t>
-            </a:r>
-            <a:r>
-              <a:rPr lang="en-CA" sz="1400" dirty="0" smtClean="0">
-                <a:solidFill>
-                  <a:srgbClr val="FF0000"/>
-                </a:solidFill>
-                <a:latin typeface="Courier New" panose="02070309020205020404" pitchFamily="49" charset="0"/>
-                <a:cs typeface="Courier New" panose="02070309020205020404" pitchFamily="49" charset="0"/>
-              </a:rPr>
-              <a:t>count </a:t>
+              <a:t> &lt;&lt; count &lt;&lt; " " &lt;&lt; students &lt;&lt; </a:t>
+            </a:r>
+            <a:r>
+              <a:rPr lang="en-CA" sz="1400" dirty="0" err="1">
+                <a:solidFill>
+                  <a:srgbClr val="FF0000"/>
+                </a:solidFill>
+                <a:latin typeface="Courier New" panose="02070309020205020404" pitchFamily="49" charset="0"/>
+                <a:cs typeface="Courier New" panose="02070309020205020404" pitchFamily="49" charset="0"/>
+              </a:rPr>
+              <a:t>endl</a:t>
             </a:r>
             <a:r>
               <a:rPr lang="en-CA" sz="1400" dirty="0">
@@ -7172,18 +6711,13 @@
                 <a:latin typeface="Courier New" panose="02070309020205020404" pitchFamily="49" charset="0"/>
                 <a:cs typeface="Courier New" panose="02070309020205020404" pitchFamily="49" charset="0"/>
               </a:rPr>
-              <a:t>&lt;&lt; " " &lt;&lt; </a:t>
-            </a:r>
-            <a:r>
-              <a:rPr lang="en-CA" sz="1400" dirty="0" smtClean="0">
-                <a:solidFill>
-                  <a:srgbClr val="FF0000"/>
-                </a:solidFill>
-                <a:latin typeface="Courier New" panose="02070309020205020404" pitchFamily="49" charset="0"/>
-                <a:cs typeface="Courier New" panose="02070309020205020404" pitchFamily="49" charset="0"/>
-              </a:rPr>
-              <a:t>students </a:t>
-            </a:r>
+              <a:t>;</a:t>
+            </a:r>
+          </a:p>
+          <a:p>
+            <a:pPr marL="274320" lvl="1" indent="0">
+              <a:buNone/>
+            </a:pPr>
             <a:r>
               <a:rPr lang="en-CA" sz="1400" dirty="0">
                 <a:solidFill>
@@ -7192,41 +6726,6 @@
                 <a:latin typeface="Courier New" panose="02070309020205020404" pitchFamily="49" charset="0"/>
                 <a:cs typeface="Courier New" panose="02070309020205020404" pitchFamily="49" charset="0"/>
               </a:rPr>
-              <a:t>&lt;&lt; </a:t>
-            </a:r>
-            <a:r>
-              <a:rPr lang="en-CA" sz="1400" dirty="0" err="1">
-                <a:solidFill>
-                  <a:srgbClr val="FF0000"/>
-                </a:solidFill>
-                <a:latin typeface="Courier New" panose="02070309020205020404" pitchFamily="49" charset="0"/>
-                <a:cs typeface="Courier New" panose="02070309020205020404" pitchFamily="49" charset="0"/>
-              </a:rPr>
-              <a:t>endl</a:t>
-            </a:r>
-            <a:r>
-              <a:rPr lang="en-CA" sz="1400" dirty="0">
-                <a:solidFill>
-                  <a:srgbClr val="FF0000"/>
-                </a:solidFill>
-                <a:latin typeface="Courier New" panose="02070309020205020404" pitchFamily="49" charset="0"/>
-                <a:cs typeface="Courier New" panose="02070309020205020404" pitchFamily="49" charset="0"/>
-              </a:rPr>
-              <a:t>;</a:t>
-            </a:r>
-          </a:p>
-          <a:p>
-            <a:pPr marL="274320" lvl="1" indent="0">
-              <a:buNone/>
-            </a:pPr>
-            <a:r>
-              <a:rPr lang="en-CA" sz="1400" dirty="0" smtClean="0">
-                <a:solidFill>
-                  <a:srgbClr val="FF0000"/>
-                </a:solidFill>
-                <a:latin typeface="Courier New" panose="02070309020205020404" pitchFamily="49" charset="0"/>
-                <a:cs typeface="Courier New" panose="02070309020205020404" pitchFamily="49" charset="0"/>
-              </a:rPr>
               <a:t>}</a:t>
             </a:r>
           </a:p>
@@ -7234,40 +6733,28 @@
             <a:pPr lvl="1"/>
             <a:r>
               <a:rPr lang="en-US" dirty="0"/>
-              <a:t>You can </a:t>
-            </a:r>
-            <a:r>
-              <a:rPr lang="en-US" dirty="0" smtClean="0"/>
-              <a:t>perform </a:t>
-            </a:r>
+              <a:t>You can perform operations on data in the result set.</a:t>
+            </a:r>
+          </a:p>
+          <a:p>
+            <a:pPr lvl="1"/>
             <a:r>
               <a:rPr lang="en-US" dirty="0"/>
-              <a:t>operations on data in the result set</a:t>
-            </a:r>
-            <a:r>
-              <a:rPr lang="en-US" dirty="0" smtClean="0"/>
-              <a:t>.</a:t>
+              <a:t>The next() method is used to fetch the next row.</a:t>
             </a:r>
           </a:p>
           <a:p>
             <a:pPr lvl="1"/>
             <a:r>
-              <a:rPr lang="en-US" dirty="0" smtClean="0"/>
-              <a:t>The next() method is used to fetch the next row.</a:t>
-            </a:r>
-          </a:p>
-          <a:p>
-            <a:pPr lvl="1"/>
-            <a:r>
-              <a:rPr lang="en-US" dirty="0" smtClean="0"/>
+              <a:rPr lang="en-US" dirty="0"/>
               <a:t>The </a:t>
             </a:r>
             <a:r>
-              <a:rPr lang="en-US" dirty="0" err="1" smtClean="0"/>
+              <a:rPr lang="en-US" dirty="0" err="1"/>
               <a:t>getXXX</a:t>
             </a:r>
             <a:r>
-              <a:rPr lang="en-US" dirty="0" smtClean="0"/>
+              <a:rPr lang="en-US" dirty="0"/>
               <a:t>() is used to fetch the value of a column. </a:t>
             </a:r>
           </a:p>
@@ -7354,54 +6841,50 @@
             </a:r>
             <a:r>
               <a:rPr lang="en-US" dirty="0"/>
-              <a:t> provides access to </a:t>
-            </a:r>
-            <a:r>
-              <a:rPr lang="en-US" dirty="0" smtClean="0"/>
-              <a:t>the result of a query.</a:t>
-            </a:r>
-          </a:p>
-          <a:p>
-            <a:r>
-              <a:rPr lang="en-US" dirty="0" smtClean="0"/>
+              <a:t> provides access to the result of a query.</a:t>
+            </a:r>
+          </a:p>
+          <a:p>
+            <a:r>
+              <a:rPr lang="en-US" dirty="0"/>
               <a:t>It provides a cursor pointing to the current row.</a:t>
             </a:r>
           </a:p>
           <a:p>
             <a:r>
-              <a:rPr lang="en-US" dirty="0" smtClean="0"/>
+              <a:rPr lang="en-US" dirty="0"/>
               <a:t>The cursor initially is pointing to the position before the first row.</a:t>
             </a:r>
           </a:p>
           <a:p>
             <a:r>
-              <a:rPr lang="en-US" dirty="0" smtClean="0"/>
+              <a:rPr lang="en-US" dirty="0"/>
               <a:t>The </a:t>
             </a:r>
             <a:r>
-              <a:rPr lang="en-US" i="1" dirty="0" smtClean="0"/>
+              <a:rPr lang="en-US" i="1" dirty="0"/>
               <a:t>next()</a:t>
             </a:r>
             <a:r>
-              <a:rPr lang="en-US" dirty="0" smtClean="0"/>
+              <a:rPr lang="en-US" dirty="0"/>
               <a:t> method moves the cursor to the next row.</a:t>
             </a:r>
           </a:p>
           <a:p>
             <a:r>
-              <a:rPr lang="en-US" dirty="0" smtClean="0"/>
+              <a:rPr lang="en-US" dirty="0"/>
               <a:t>The </a:t>
             </a:r>
             <a:r>
-              <a:rPr lang="en-US" i="1" dirty="0" err="1" smtClean="0"/>
+              <a:rPr lang="en-US" i="1" dirty="0" err="1"/>
               <a:t>getxxx</a:t>
             </a:r>
             <a:r>
-              <a:rPr lang="en-US" i="1" dirty="0" smtClean="0"/>
+              <a:rPr lang="en-US" i="1" dirty="0"/>
               <a:t>()</a:t>
             </a:r>
             <a:r>
-              <a:rPr lang="en-US" dirty="0" smtClean="0"/>
+              <a:rPr lang="en-US" dirty="0"/>
               <a:t> method is used to fetch the value of a column.</a:t>
             </a:r>
           </a:p>
@@ -7437,10 +6920,6 @@
               </a:rPr>
               <a:t>() </a:t>
             </a:r>
-            <a:endParaRPr lang="en-US" dirty="0" smtClean="0">
-              <a:latin typeface="Courier New" panose="02070309020205020404" pitchFamily="49" charset="0"/>
-              <a:cs typeface="Courier New" panose="02070309020205020404" pitchFamily="49" charset="0"/>
-            </a:endParaRPr>
           </a:p>
           <a:p>
             <a:pPr marL="274320" lvl="1" indent="0">
@@ -7741,7 +7220,7 @@
           <a:lstStyle/>
           <a:p>
             <a:r>
-              <a:rPr lang="en-US" dirty="0" smtClean="0"/>
+              <a:rPr lang="en-US" dirty="0"/>
               <a:t>Query with Variables</a:t>
             </a:r>
             <a:endParaRPr lang="en-CA" dirty="0"/>
@@ -7764,21 +7243,21 @@
           <a:lstStyle/>
           <a:p>
             <a:r>
-              <a:rPr lang="en-US" dirty="0" smtClean="0"/>
+              <a:rPr lang="en-US" dirty="0"/>
               <a:t>Variables can be used to specify values in the WHERE clause of a SQL query.</a:t>
             </a:r>
           </a:p>
           <a:p>
             <a:r>
-              <a:rPr lang="en-US" dirty="0" smtClean="0"/>
+              <a:rPr lang="en-US" dirty="0"/>
               <a:t>We want to find students with </a:t>
             </a:r>
             <a:r>
-              <a:rPr lang="en-US" dirty="0" err="1" smtClean="0"/>
+              <a:rPr lang="en-US" dirty="0" err="1"/>
               <a:t>gpa</a:t>
             </a:r>
             <a:r>
-              <a:rPr lang="en-US" dirty="0" smtClean="0"/>
+              <a:rPr lang="en-US" dirty="0"/>
               <a:t> 3.2:</a:t>
             </a:r>
           </a:p>
@@ -7824,17 +7303,17 @@
                 <a:latin typeface="Courier New" panose="02070309020205020404" pitchFamily="49" charset="0"/>
                 <a:cs typeface="Courier New" panose="02070309020205020404" pitchFamily="49" charset="0"/>
               </a:rPr>
-              <a:t>("SELECT * FROM </a:t>
-            </a:r>
-            <a:r>
-              <a:rPr lang="en-US" sz="1400" dirty="0" smtClean="0">
-                <a:solidFill>
-                  <a:srgbClr val="FF0000"/>
-                </a:solidFill>
-                <a:latin typeface="Courier New" panose="02070309020205020404" pitchFamily="49" charset="0"/>
-                <a:cs typeface="Courier New" panose="02070309020205020404" pitchFamily="49" charset="0"/>
-              </a:rPr>
-              <a:t>student </a:t>
+              <a:t>("SELECT * FROM student WHERE </a:t>
+            </a:r>
+            <a:r>
+              <a:rPr lang="en-US" sz="1400" dirty="0" err="1">
+                <a:solidFill>
+                  <a:srgbClr val="FF0000"/>
+                </a:solidFill>
+                <a:latin typeface="Courier New" panose="02070309020205020404" pitchFamily="49" charset="0"/>
+                <a:cs typeface="Courier New" panose="02070309020205020404" pitchFamily="49" charset="0"/>
+              </a:rPr>
+              <a:t>gpa</a:t>
             </a:r>
             <a:r>
               <a:rPr lang="en-US" sz="1400" dirty="0">
@@ -7844,10 +7323,25 @@
                 <a:latin typeface="Courier New" panose="02070309020205020404" pitchFamily="49" charset="0"/>
                 <a:cs typeface="Courier New" panose="02070309020205020404" pitchFamily="49" charset="0"/>
               </a:rPr>
-              <a:t>WHERE </a:t>
-            </a:r>
-            <a:r>
-              <a:rPr lang="en-US" sz="1400" dirty="0" err="1" smtClean="0">
+              <a:t> &gt;= :1");</a:t>
+            </a:r>
+          </a:p>
+          <a:p>
+            <a:pPr marL="274320" lvl="1" indent="0">
+              <a:buNone/>
+            </a:pPr>
+            <a:r>
+              <a:rPr lang="en-CA" sz="1400" dirty="0">
+                <a:solidFill>
+                  <a:srgbClr val="FF0000"/>
+                </a:solidFill>
+                <a:latin typeface="Courier New" panose="02070309020205020404" pitchFamily="49" charset="0"/>
+                <a:cs typeface="Courier New" panose="02070309020205020404" pitchFamily="49" charset="0"/>
+              </a:rPr>
+              <a:t>float </a:t>
+            </a:r>
+            <a:r>
+              <a:rPr lang="en-CA" sz="1400" dirty="0" err="1">
                 <a:solidFill>
                   <a:srgbClr val="FF0000"/>
                 </a:solidFill>
@@ -7857,14 +7351,29 @@
               <a:t>gpa</a:t>
             </a:r>
             <a:r>
-              <a:rPr lang="en-US" sz="1400" dirty="0" smtClean="0">
-                <a:solidFill>
-                  <a:srgbClr val="FF0000"/>
-                </a:solidFill>
-                <a:latin typeface="Courier New" panose="02070309020205020404" pitchFamily="49" charset="0"/>
-                <a:cs typeface="Courier New" panose="02070309020205020404" pitchFamily="49" charset="0"/>
-              </a:rPr>
-              <a:t> </a:t>
+              <a:rPr lang="en-CA" sz="1400" dirty="0">
+                <a:solidFill>
+                  <a:srgbClr val="FF0000"/>
+                </a:solidFill>
+                <a:latin typeface="Courier New" panose="02070309020205020404" pitchFamily="49" charset="0"/>
+                <a:cs typeface="Courier New" panose="02070309020205020404" pitchFamily="49" charset="0"/>
+              </a:rPr>
+              <a:t> = 3.2;</a:t>
+            </a:r>
+          </a:p>
+          <a:p>
+            <a:pPr marL="274320" lvl="1" indent="0">
+              <a:buNone/>
+            </a:pPr>
+            <a:r>
+              <a:rPr lang="en-US" sz="1400" dirty="0" err="1">
+                <a:solidFill>
+                  <a:srgbClr val="FF0000"/>
+                </a:solidFill>
+                <a:latin typeface="Courier New" panose="02070309020205020404" pitchFamily="49" charset="0"/>
+                <a:cs typeface="Courier New" panose="02070309020205020404" pitchFamily="49" charset="0"/>
+              </a:rPr>
+              <a:t>stmt</a:t>
             </a:r>
             <a:r>
               <a:rPr lang="en-US" sz="1400" dirty="0">
@@ -7874,7 +7383,47 @@
                 <a:latin typeface="Courier New" panose="02070309020205020404" pitchFamily="49" charset="0"/>
                 <a:cs typeface="Courier New" panose="02070309020205020404" pitchFamily="49" charset="0"/>
               </a:rPr>
-              <a:t>&gt;= :1");</a:t>
+              <a:t>-&gt;</a:t>
+            </a:r>
+            <a:r>
+              <a:rPr lang="en-US" sz="1400" dirty="0" err="1">
+                <a:solidFill>
+                  <a:srgbClr val="FF0000"/>
+                </a:solidFill>
+                <a:latin typeface="Courier New" panose="02070309020205020404" pitchFamily="49" charset="0"/>
+                <a:cs typeface="Courier New" panose="02070309020205020404" pitchFamily="49" charset="0"/>
+              </a:rPr>
+              <a:t>setFloat</a:t>
+            </a:r>
+            <a:r>
+              <a:rPr lang="en-US" sz="1400" dirty="0">
+                <a:solidFill>
+                  <a:srgbClr val="FF0000"/>
+                </a:solidFill>
+                <a:latin typeface="Courier New" panose="02070309020205020404" pitchFamily="49" charset="0"/>
+                <a:cs typeface="Courier New" panose="02070309020205020404" pitchFamily="49" charset="0"/>
+              </a:rPr>
+              <a:t>(1, </a:t>
+            </a:r>
+            <a:r>
+              <a:rPr lang="en-US" sz="1400" dirty="0" err="1">
+                <a:solidFill>
+                  <a:srgbClr val="FF0000"/>
+                </a:solidFill>
+                <a:latin typeface="Courier New" panose="02070309020205020404" pitchFamily="49" charset="0"/>
+                <a:cs typeface="Courier New" panose="02070309020205020404" pitchFamily="49" charset="0"/>
+              </a:rPr>
+              <a:t>gpa</a:t>
+            </a:r>
+            <a:r>
+              <a:rPr lang="en-US" sz="1400" dirty="0">
+                <a:solidFill>
+                  <a:srgbClr val="FF0000"/>
+                </a:solidFill>
+                <a:latin typeface="Courier New" panose="02070309020205020404" pitchFamily="49" charset="0"/>
+                <a:cs typeface="Courier New" panose="02070309020205020404" pitchFamily="49" charset="0"/>
+              </a:rPr>
+              <a:t>); // set the parameter</a:t>
             </a:r>
           </a:p>
           <a:p>
@@ -7882,34 +7431,14 @@
               <a:buNone/>
             </a:pPr>
             <a:r>
-              <a:rPr lang="en-CA" sz="1400" dirty="0" smtClean="0">
-                <a:solidFill>
-                  <a:srgbClr val="FF0000"/>
-                </a:solidFill>
-                <a:latin typeface="Courier New" panose="02070309020205020404" pitchFamily="49" charset="0"/>
-                <a:cs typeface="Courier New" panose="02070309020205020404" pitchFamily="49" charset="0"/>
-              </a:rPr>
-              <a:t>float </a:t>
-            </a:r>
-            <a:r>
-              <a:rPr lang="en-CA" sz="1400" dirty="0" err="1" smtClean="0">
-                <a:solidFill>
-                  <a:srgbClr val="FF0000"/>
-                </a:solidFill>
-                <a:latin typeface="Courier New" panose="02070309020205020404" pitchFamily="49" charset="0"/>
-                <a:cs typeface="Courier New" panose="02070309020205020404" pitchFamily="49" charset="0"/>
-              </a:rPr>
-              <a:t>gpa</a:t>
-            </a:r>
-            <a:r>
-              <a:rPr lang="en-CA" sz="1400" dirty="0" smtClean="0">
-                <a:solidFill>
-                  <a:srgbClr val="FF0000"/>
-                </a:solidFill>
-                <a:latin typeface="Courier New" panose="02070309020205020404" pitchFamily="49" charset="0"/>
-                <a:cs typeface="Courier New" panose="02070309020205020404" pitchFamily="49" charset="0"/>
-              </a:rPr>
-              <a:t> </a:t>
+              <a:rPr lang="en-CA" sz="1400" dirty="0" err="1">
+                <a:solidFill>
+                  <a:srgbClr val="FF0000"/>
+                </a:solidFill>
+                <a:latin typeface="Courier New" panose="02070309020205020404" pitchFamily="49" charset="0"/>
+                <a:cs typeface="Courier New" panose="02070309020205020404" pitchFamily="49" charset="0"/>
+              </a:rPr>
+              <a:t>ResultSet</a:t>
             </a:r>
             <a:r>
               <a:rPr lang="en-CA" sz="1400" dirty="0">
@@ -7919,25 +7448,68 @@
                 <a:latin typeface="Courier New" panose="02070309020205020404" pitchFamily="49" charset="0"/>
                 <a:cs typeface="Courier New" panose="02070309020205020404" pitchFamily="49" charset="0"/>
               </a:rPr>
-              <a:t>= </a:t>
-            </a:r>
-            <a:r>
-              <a:rPr lang="en-CA" sz="1400" dirty="0" smtClean="0">
-                <a:solidFill>
-                  <a:srgbClr val="FF0000"/>
-                </a:solidFill>
-                <a:latin typeface="Courier New" panose="02070309020205020404" pitchFamily="49" charset="0"/>
-                <a:cs typeface="Courier New" panose="02070309020205020404" pitchFamily="49" charset="0"/>
-              </a:rPr>
-              <a:t>3.2;</a:t>
-            </a:r>
-            <a:endParaRPr lang="en-CA" sz="1400" dirty="0">
-              <a:solidFill>
-                <a:srgbClr val="FF0000"/>
-              </a:solidFill>
-              <a:latin typeface="Courier New" panose="02070309020205020404" pitchFamily="49" charset="0"/>
-              <a:cs typeface="Courier New" panose="02070309020205020404" pitchFamily="49" charset="0"/>
-            </a:endParaRPr>
+              <a:t> *</a:t>
+            </a:r>
+            <a:r>
+              <a:rPr lang="en-CA" sz="1400" dirty="0" err="1">
+                <a:solidFill>
+                  <a:srgbClr val="FF0000"/>
+                </a:solidFill>
+                <a:latin typeface="Courier New" panose="02070309020205020404" pitchFamily="49" charset="0"/>
+                <a:cs typeface="Courier New" panose="02070309020205020404" pitchFamily="49" charset="0"/>
+              </a:rPr>
+              <a:t>rs</a:t>
+            </a:r>
+            <a:r>
+              <a:rPr lang="en-CA" sz="1400" dirty="0">
+                <a:solidFill>
+                  <a:srgbClr val="FF0000"/>
+                </a:solidFill>
+                <a:latin typeface="Courier New" panose="02070309020205020404" pitchFamily="49" charset="0"/>
+                <a:cs typeface="Courier New" panose="02070309020205020404" pitchFamily="49" charset="0"/>
+              </a:rPr>
+              <a:t> = </a:t>
+            </a:r>
+            <a:r>
+              <a:rPr lang="en-CA" sz="1400" dirty="0" err="1">
+                <a:solidFill>
+                  <a:srgbClr val="FF0000"/>
+                </a:solidFill>
+                <a:latin typeface="Courier New" panose="02070309020205020404" pitchFamily="49" charset="0"/>
+                <a:cs typeface="Courier New" panose="02070309020205020404" pitchFamily="49" charset="0"/>
+              </a:rPr>
+              <a:t>stmt</a:t>
+            </a:r>
+            <a:r>
+              <a:rPr lang="en-CA" sz="1400" dirty="0">
+                <a:solidFill>
+                  <a:srgbClr val="FF0000"/>
+                </a:solidFill>
+                <a:latin typeface="Courier New" panose="02070309020205020404" pitchFamily="49" charset="0"/>
+                <a:cs typeface="Courier New" panose="02070309020205020404" pitchFamily="49" charset="0"/>
+              </a:rPr>
+              <a:t>-&gt;</a:t>
+            </a:r>
+            <a:r>
+              <a:rPr lang="en-CA" sz="1400" dirty="0" err="1">
+                <a:solidFill>
+                  <a:srgbClr val="FF0000"/>
+                </a:solidFill>
+                <a:latin typeface="Courier New" panose="02070309020205020404" pitchFamily="49" charset="0"/>
+                <a:cs typeface="Courier New" panose="02070309020205020404" pitchFamily="49" charset="0"/>
+              </a:rPr>
+              <a:t>executeQuery</a:t>
+            </a:r>
+            <a:r>
+              <a:rPr lang="en-CA" sz="1400" dirty="0">
+                <a:solidFill>
+                  <a:srgbClr val="FF0000"/>
+                </a:solidFill>
+                <a:latin typeface="Courier New" panose="02070309020205020404" pitchFamily="49" charset="0"/>
+                <a:cs typeface="Courier New" panose="02070309020205020404" pitchFamily="49" charset="0"/>
+              </a:rPr>
+              <a:t>();</a:t>
+            </a:r>
           </a:p>
           <a:p>
             <a:pPr marL="274320" lvl="1" indent="0">
@@ -7951,7 +7523,7 @@
                 <a:latin typeface="Courier New" panose="02070309020205020404" pitchFamily="49" charset="0"/>
                 <a:cs typeface="Courier New" panose="02070309020205020404" pitchFamily="49" charset="0"/>
               </a:rPr>
-              <a:t>stmt</a:t>
+              <a:t>cout</a:t>
             </a:r>
             <a:r>
               <a:rPr lang="en-US" sz="1400" dirty="0">
@@ -7961,27 +7533,127 @@
                 <a:latin typeface="Courier New" panose="02070309020205020404" pitchFamily="49" charset="0"/>
                 <a:cs typeface="Courier New" panose="02070309020205020404" pitchFamily="49" charset="0"/>
               </a:rPr>
+              <a:t> &lt;&lt; "The students with GPA 3.2:" &lt;&lt; </a:t>
+            </a:r>
+            <a:r>
+              <a:rPr lang="en-US" sz="1400" dirty="0" err="1">
+                <a:solidFill>
+                  <a:srgbClr val="FF0000"/>
+                </a:solidFill>
+                <a:latin typeface="Courier New" panose="02070309020205020404" pitchFamily="49" charset="0"/>
+                <a:cs typeface="Courier New" panose="02070309020205020404" pitchFamily="49" charset="0"/>
+              </a:rPr>
+              <a:t>endl</a:t>
+            </a:r>
+            <a:r>
+              <a:rPr lang="en-US" sz="1400" dirty="0">
+                <a:solidFill>
+                  <a:srgbClr val="FF0000"/>
+                </a:solidFill>
+                <a:latin typeface="Courier New" panose="02070309020205020404" pitchFamily="49" charset="0"/>
+                <a:cs typeface="Courier New" panose="02070309020205020404" pitchFamily="49" charset="0"/>
+              </a:rPr>
+              <a:t>;</a:t>
+            </a:r>
+          </a:p>
+          <a:p>
+            <a:pPr marL="274320" lvl="1" indent="0">
+              <a:buNone/>
+            </a:pPr>
+            <a:r>
+              <a:rPr lang="en-CA" sz="1400" dirty="0">
+                <a:solidFill>
+                  <a:srgbClr val="FF0000"/>
+                </a:solidFill>
+                <a:latin typeface="Courier New" panose="02070309020205020404" pitchFamily="49" charset="0"/>
+                <a:cs typeface="Courier New" panose="02070309020205020404" pitchFamily="49" charset="0"/>
+              </a:rPr>
+              <a:t>while (</a:t>
+            </a:r>
+            <a:r>
+              <a:rPr lang="en-CA" sz="1400" dirty="0" err="1">
+                <a:solidFill>
+                  <a:srgbClr val="FF0000"/>
+                </a:solidFill>
+                <a:latin typeface="Courier New" panose="02070309020205020404" pitchFamily="49" charset="0"/>
+                <a:cs typeface="Courier New" panose="02070309020205020404" pitchFamily="49" charset="0"/>
+              </a:rPr>
+              <a:t>rs</a:t>
+            </a:r>
+            <a:r>
+              <a:rPr lang="en-CA" sz="1400" dirty="0">
+                <a:solidFill>
+                  <a:srgbClr val="FF0000"/>
+                </a:solidFill>
+                <a:latin typeface="Courier New" panose="02070309020205020404" pitchFamily="49" charset="0"/>
+                <a:cs typeface="Courier New" panose="02070309020205020404" pitchFamily="49" charset="0"/>
+              </a:rPr>
+              <a:t>-&gt;next())</a:t>
+            </a:r>
+          </a:p>
+          <a:p>
+            <a:pPr marL="274320" lvl="1" indent="0">
+              <a:buNone/>
+            </a:pPr>
+            <a:r>
+              <a:rPr lang="en-US" sz="1400" dirty="0">
+                <a:solidFill>
+                  <a:srgbClr val="FF0000"/>
+                </a:solidFill>
+                <a:latin typeface="Courier New" panose="02070309020205020404" pitchFamily="49" charset="0"/>
+                <a:cs typeface="Courier New" panose="02070309020205020404" pitchFamily="49" charset="0"/>
+              </a:rPr>
+              <a:t>	</a:t>
+            </a:r>
+            <a:r>
+              <a:rPr lang="en-US" sz="1400" dirty="0" err="1">
+                <a:solidFill>
+                  <a:srgbClr val="FF0000"/>
+                </a:solidFill>
+                <a:latin typeface="Courier New" panose="02070309020205020404" pitchFamily="49" charset="0"/>
+                <a:cs typeface="Courier New" panose="02070309020205020404" pitchFamily="49" charset="0"/>
+              </a:rPr>
+              <a:t>cout</a:t>
+            </a:r>
+            <a:r>
+              <a:rPr lang="en-US" sz="1400" dirty="0">
+                <a:solidFill>
+                  <a:srgbClr val="FF0000"/>
+                </a:solidFill>
+                <a:latin typeface="Courier New" panose="02070309020205020404" pitchFamily="49" charset="0"/>
+                <a:cs typeface="Courier New" panose="02070309020205020404" pitchFamily="49" charset="0"/>
+              </a:rPr>
+              <a:t> &lt;&lt; </a:t>
+            </a:r>
+            <a:r>
+              <a:rPr lang="en-US" sz="1400" dirty="0" err="1">
+                <a:solidFill>
+                  <a:srgbClr val="FF0000"/>
+                </a:solidFill>
+                <a:latin typeface="Courier New" panose="02070309020205020404" pitchFamily="49" charset="0"/>
+                <a:cs typeface="Courier New" panose="02070309020205020404" pitchFamily="49" charset="0"/>
+              </a:rPr>
+              <a:t>rs</a:t>
+            </a:r>
+            <a:r>
+              <a:rPr lang="en-US" sz="1400" dirty="0">
+                <a:solidFill>
+                  <a:srgbClr val="FF0000"/>
+                </a:solidFill>
+                <a:latin typeface="Courier New" panose="02070309020205020404" pitchFamily="49" charset="0"/>
+                <a:cs typeface="Courier New" panose="02070309020205020404" pitchFamily="49" charset="0"/>
+              </a:rPr>
               <a:t>-&gt;</a:t>
             </a:r>
             <a:r>
-              <a:rPr lang="en-US" sz="1400" dirty="0" err="1" smtClean="0">
-                <a:solidFill>
-                  <a:srgbClr val="FF0000"/>
-                </a:solidFill>
-                <a:latin typeface="Courier New" panose="02070309020205020404" pitchFamily="49" charset="0"/>
-                <a:cs typeface="Courier New" panose="02070309020205020404" pitchFamily="49" charset="0"/>
-              </a:rPr>
-              <a:t>setFloat</a:t>
-            </a:r>
-            <a:r>
-              <a:rPr lang="en-US" sz="1400" dirty="0" smtClean="0">
-                <a:solidFill>
-                  <a:srgbClr val="FF0000"/>
-                </a:solidFill>
-                <a:latin typeface="Courier New" panose="02070309020205020404" pitchFamily="49" charset="0"/>
-                <a:cs typeface="Courier New" panose="02070309020205020404" pitchFamily="49" charset="0"/>
-              </a:rPr>
-              <a:t>(1</a:t>
+              <a:rPr lang="en-US" sz="1400" dirty="0" err="1">
+                <a:solidFill>
+                  <a:srgbClr val="FF0000"/>
+                </a:solidFill>
+                <a:latin typeface="Courier New" panose="02070309020205020404" pitchFamily="49" charset="0"/>
+                <a:cs typeface="Courier New" panose="02070309020205020404" pitchFamily="49" charset="0"/>
+              </a:rPr>
+              <a:t>getInt</a:t>
             </a:r>
             <a:r>
               <a:rPr lang="en-US" sz="1400" dirty="0">
@@ -7991,27 +7663,17 @@
                 <a:latin typeface="Courier New" panose="02070309020205020404" pitchFamily="49" charset="0"/>
                 <a:cs typeface="Courier New" panose="02070309020205020404" pitchFamily="49" charset="0"/>
               </a:rPr>
-              <a:t>, </a:t>
-            </a:r>
-            <a:r>
-              <a:rPr lang="en-US" sz="1400" dirty="0" err="1" smtClean="0">
-                <a:solidFill>
-                  <a:srgbClr val="FF0000"/>
-                </a:solidFill>
-                <a:latin typeface="Courier New" panose="02070309020205020404" pitchFamily="49" charset="0"/>
-                <a:cs typeface="Courier New" panose="02070309020205020404" pitchFamily="49" charset="0"/>
-              </a:rPr>
-              <a:t>gpa</a:t>
-            </a:r>
-            <a:r>
-              <a:rPr lang="en-US" sz="1400" dirty="0" smtClean="0">
-                <a:solidFill>
-                  <a:srgbClr val="FF0000"/>
-                </a:solidFill>
-                <a:latin typeface="Courier New" panose="02070309020205020404" pitchFamily="49" charset="0"/>
-                <a:cs typeface="Courier New" panose="02070309020205020404" pitchFamily="49" charset="0"/>
-              </a:rPr>
-              <a:t>); </a:t>
+              <a:t>(1) &lt;&lt; " " &lt;&lt; </a:t>
+            </a:r>
+            <a:r>
+              <a:rPr lang="en-US" sz="1400" dirty="0" err="1">
+                <a:solidFill>
+                  <a:srgbClr val="FF0000"/>
+                </a:solidFill>
+                <a:latin typeface="Courier New" panose="02070309020205020404" pitchFamily="49" charset="0"/>
+                <a:cs typeface="Courier New" panose="02070309020205020404" pitchFamily="49" charset="0"/>
+              </a:rPr>
+              <a:t>rs</a:t>
             </a:r>
             <a:r>
               <a:rPr lang="en-US" sz="1400" dirty="0">
@@ -8021,17 +7683,17 @@
                 <a:latin typeface="Courier New" panose="02070309020205020404" pitchFamily="49" charset="0"/>
                 <a:cs typeface="Courier New" panose="02070309020205020404" pitchFamily="49" charset="0"/>
               </a:rPr>
-              <a:t>// set </a:t>
-            </a:r>
-            <a:r>
-              <a:rPr lang="en-US" sz="1400" dirty="0" smtClean="0">
-                <a:solidFill>
-                  <a:srgbClr val="FF0000"/>
-                </a:solidFill>
-                <a:latin typeface="Courier New" panose="02070309020205020404" pitchFamily="49" charset="0"/>
-                <a:cs typeface="Courier New" panose="02070309020205020404" pitchFamily="49" charset="0"/>
-              </a:rPr>
-              <a:t>the </a:t>
+              <a:t>-&gt;</a:t>
+            </a:r>
+            <a:r>
+              <a:rPr lang="en-US" sz="1400" dirty="0" err="1">
+                <a:solidFill>
+                  <a:srgbClr val="FF0000"/>
+                </a:solidFill>
+                <a:latin typeface="Courier New" panose="02070309020205020404" pitchFamily="49" charset="0"/>
+                <a:cs typeface="Courier New" panose="02070309020205020404" pitchFamily="49" charset="0"/>
+              </a:rPr>
+              <a:t>getString</a:t>
             </a:r>
             <a:r>
               <a:rPr lang="en-US" sz="1400" dirty="0">
@@ -8041,337 +7703,7 @@
                 <a:latin typeface="Courier New" panose="02070309020205020404" pitchFamily="49" charset="0"/>
                 <a:cs typeface="Courier New" panose="02070309020205020404" pitchFamily="49" charset="0"/>
               </a:rPr>
-              <a:t>parameter</a:t>
-            </a:r>
-          </a:p>
-          <a:p>
-            <a:pPr marL="274320" lvl="1" indent="0">
-              <a:buNone/>
-            </a:pPr>
-            <a:r>
-              <a:rPr lang="en-CA" sz="1400" dirty="0" err="1">
-                <a:solidFill>
-                  <a:srgbClr val="FF0000"/>
-                </a:solidFill>
-                <a:latin typeface="Courier New" panose="02070309020205020404" pitchFamily="49" charset="0"/>
-                <a:cs typeface="Courier New" panose="02070309020205020404" pitchFamily="49" charset="0"/>
-              </a:rPr>
-              <a:t>ResultSet</a:t>
-            </a:r>
-            <a:r>
-              <a:rPr lang="en-CA" sz="1400" dirty="0">
-                <a:solidFill>
-                  <a:srgbClr val="FF0000"/>
-                </a:solidFill>
-                <a:latin typeface="Courier New" panose="02070309020205020404" pitchFamily="49" charset="0"/>
-                <a:cs typeface="Courier New" panose="02070309020205020404" pitchFamily="49" charset="0"/>
-              </a:rPr>
-              <a:t> *</a:t>
-            </a:r>
-            <a:r>
-              <a:rPr lang="en-CA" sz="1400" dirty="0" err="1">
-                <a:solidFill>
-                  <a:srgbClr val="FF0000"/>
-                </a:solidFill>
-                <a:latin typeface="Courier New" panose="02070309020205020404" pitchFamily="49" charset="0"/>
-                <a:cs typeface="Courier New" panose="02070309020205020404" pitchFamily="49" charset="0"/>
-              </a:rPr>
-              <a:t>rs</a:t>
-            </a:r>
-            <a:r>
-              <a:rPr lang="en-CA" sz="1400" dirty="0">
-                <a:solidFill>
-                  <a:srgbClr val="FF0000"/>
-                </a:solidFill>
-                <a:latin typeface="Courier New" panose="02070309020205020404" pitchFamily="49" charset="0"/>
-                <a:cs typeface="Courier New" panose="02070309020205020404" pitchFamily="49" charset="0"/>
-              </a:rPr>
-              <a:t> = </a:t>
-            </a:r>
-            <a:r>
-              <a:rPr lang="en-CA" sz="1400" dirty="0" err="1">
-                <a:solidFill>
-                  <a:srgbClr val="FF0000"/>
-                </a:solidFill>
-                <a:latin typeface="Courier New" panose="02070309020205020404" pitchFamily="49" charset="0"/>
-                <a:cs typeface="Courier New" panose="02070309020205020404" pitchFamily="49" charset="0"/>
-              </a:rPr>
-              <a:t>stmt</a:t>
-            </a:r>
-            <a:r>
-              <a:rPr lang="en-CA" sz="1400" dirty="0">
-                <a:solidFill>
-                  <a:srgbClr val="FF0000"/>
-                </a:solidFill>
-                <a:latin typeface="Courier New" panose="02070309020205020404" pitchFamily="49" charset="0"/>
-                <a:cs typeface="Courier New" panose="02070309020205020404" pitchFamily="49" charset="0"/>
-              </a:rPr>
-              <a:t>-&gt;</a:t>
-            </a:r>
-            <a:r>
-              <a:rPr lang="en-CA" sz="1400" dirty="0" err="1">
-                <a:solidFill>
-                  <a:srgbClr val="FF0000"/>
-                </a:solidFill>
-                <a:latin typeface="Courier New" panose="02070309020205020404" pitchFamily="49" charset="0"/>
-                <a:cs typeface="Courier New" panose="02070309020205020404" pitchFamily="49" charset="0"/>
-              </a:rPr>
-              <a:t>executeQuery</a:t>
-            </a:r>
-            <a:r>
-              <a:rPr lang="en-CA" sz="1400" dirty="0">
-                <a:solidFill>
-                  <a:srgbClr val="FF0000"/>
-                </a:solidFill>
-                <a:latin typeface="Courier New" panose="02070309020205020404" pitchFamily="49" charset="0"/>
-                <a:cs typeface="Courier New" panose="02070309020205020404" pitchFamily="49" charset="0"/>
-              </a:rPr>
-              <a:t>();</a:t>
-            </a:r>
-          </a:p>
-          <a:p>
-            <a:pPr marL="274320" lvl="1" indent="0">
-              <a:buNone/>
-            </a:pPr>
-            <a:r>
-              <a:rPr lang="en-US" sz="1400" dirty="0" err="1">
-                <a:solidFill>
-                  <a:srgbClr val="FF0000"/>
-                </a:solidFill>
-                <a:latin typeface="Courier New" panose="02070309020205020404" pitchFamily="49" charset="0"/>
-                <a:cs typeface="Courier New" panose="02070309020205020404" pitchFamily="49" charset="0"/>
-              </a:rPr>
-              <a:t>cout</a:t>
-            </a:r>
-            <a:r>
-              <a:rPr lang="en-US" sz="1400" dirty="0">
-                <a:solidFill>
-                  <a:srgbClr val="FF0000"/>
-                </a:solidFill>
-                <a:latin typeface="Courier New" panose="02070309020205020404" pitchFamily="49" charset="0"/>
-                <a:cs typeface="Courier New" panose="02070309020205020404" pitchFamily="49" charset="0"/>
-              </a:rPr>
-              <a:t> &lt;&lt; "The </a:t>
-            </a:r>
-            <a:r>
-              <a:rPr lang="en-US" sz="1400" dirty="0" smtClean="0">
-                <a:solidFill>
-                  <a:srgbClr val="FF0000"/>
-                </a:solidFill>
-                <a:latin typeface="Courier New" panose="02070309020205020404" pitchFamily="49" charset="0"/>
-                <a:cs typeface="Courier New" panose="02070309020205020404" pitchFamily="49" charset="0"/>
-              </a:rPr>
-              <a:t>students with GPA 3.2:" </a:t>
-            </a:r>
-            <a:r>
-              <a:rPr lang="en-US" sz="1400" dirty="0">
-                <a:solidFill>
-                  <a:srgbClr val="FF0000"/>
-                </a:solidFill>
-                <a:latin typeface="Courier New" panose="02070309020205020404" pitchFamily="49" charset="0"/>
-                <a:cs typeface="Courier New" panose="02070309020205020404" pitchFamily="49" charset="0"/>
-              </a:rPr>
-              <a:t>&lt;&lt; </a:t>
-            </a:r>
-            <a:r>
-              <a:rPr lang="en-US" sz="1400" dirty="0" err="1">
-                <a:solidFill>
-                  <a:srgbClr val="FF0000"/>
-                </a:solidFill>
-                <a:latin typeface="Courier New" panose="02070309020205020404" pitchFamily="49" charset="0"/>
-                <a:cs typeface="Courier New" panose="02070309020205020404" pitchFamily="49" charset="0"/>
-              </a:rPr>
-              <a:t>endl</a:t>
-            </a:r>
-            <a:r>
-              <a:rPr lang="en-US" sz="1400" dirty="0">
-                <a:solidFill>
-                  <a:srgbClr val="FF0000"/>
-                </a:solidFill>
-                <a:latin typeface="Courier New" panose="02070309020205020404" pitchFamily="49" charset="0"/>
-                <a:cs typeface="Courier New" panose="02070309020205020404" pitchFamily="49" charset="0"/>
-              </a:rPr>
-              <a:t>;</a:t>
-            </a:r>
-          </a:p>
-          <a:p>
-            <a:pPr marL="274320" lvl="1" indent="0">
-              <a:buNone/>
-            </a:pPr>
-            <a:r>
-              <a:rPr lang="en-CA" sz="1400" dirty="0">
-                <a:solidFill>
-                  <a:srgbClr val="FF0000"/>
-                </a:solidFill>
-                <a:latin typeface="Courier New" panose="02070309020205020404" pitchFamily="49" charset="0"/>
-                <a:cs typeface="Courier New" panose="02070309020205020404" pitchFamily="49" charset="0"/>
-              </a:rPr>
-              <a:t>while (</a:t>
-            </a:r>
-            <a:r>
-              <a:rPr lang="en-CA" sz="1400" dirty="0" err="1">
-                <a:solidFill>
-                  <a:srgbClr val="FF0000"/>
-                </a:solidFill>
-                <a:latin typeface="Courier New" panose="02070309020205020404" pitchFamily="49" charset="0"/>
-                <a:cs typeface="Courier New" panose="02070309020205020404" pitchFamily="49" charset="0"/>
-              </a:rPr>
-              <a:t>rs</a:t>
-            </a:r>
-            <a:r>
-              <a:rPr lang="en-CA" sz="1400" dirty="0">
-                <a:solidFill>
-                  <a:srgbClr val="FF0000"/>
-                </a:solidFill>
-                <a:latin typeface="Courier New" panose="02070309020205020404" pitchFamily="49" charset="0"/>
-                <a:cs typeface="Courier New" panose="02070309020205020404" pitchFamily="49" charset="0"/>
-              </a:rPr>
-              <a:t>-&gt;next())</a:t>
-            </a:r>
-          </a:p>
-          <a:p>
-            <a:pPr marL="274320" lvl="1" indent="0">
-              <a:buNone/>
-            </a:pPr>
-            <a:r>
-              <a:rPr lang="en-US" sz="1400" dirty="0" smtClean="0">
-                <a:solidFill>
-                  <a:srgbClr val="FF0000"/>
-                </a:solidFill>
-                <a:latin typeface="Courier New" panose="02070309020205020404" pitchFamily="49" charset="0"/>
-                <a:cs typeface="Courier New" panose="02070309020205020404" pitchFamily="49" charset="0"/>
-              </a:rPr>
-              <a:t>	</a:t>
-            </a:r>
-            <a:r>
-              <a:rPr lang="en-US" sz="1400" dirty="0" err="1" smtClean="0">
-                <a:solidFill>
-                  <a:srgbClr val="FF0000"/>
-                </a:solidFill>
-                <a:latin typeface="Courier New" panose="02070309020205020404" pitchFamily="49" charset="0"/>
-                <a:cs typeface="Courier New" panose="02070309020205020404" pitchFamily="49" charset="0"/>
-              </a:rPr>
-              <a:t>cout</a:t>
-            </a:r>
-            <a:r>
-              <a:rPr lang="en-US" sz="1400" dirty="0" smtClean="0">
-                <a:solidFill>
-                  <a:srgbClr val="FF0000"/>
-                </a:solidFill>
-                <a:latin typeface="Courier New" panose="02070309020205020404" pitchFamily="49" charset="0"/>
-                <a:cs typeface="Courier New" panose="02070309020205020404" pitchFamily="49" charset="0"/>
-              </a:rPr>
-              <a:t> </a:t>
-            </a:r>
-            <a:r>
-              <a:rPr lang="en-US" sz="1400" dirty="0">
-                <a:solidFill>
-                  <a:srgbClr val="FF0000"/>
-                </a:solidFill>
-                <a:latin typeface="Courier New" panose="02070309020205020404" pitchFamily="49" charset="0"/>
-                <a:cs typeface="Courier New" panose="02070309020205020404" pitchFamily="49" charset="0"/>
-              </a:rPr>
-              <a:t>&lt;&lt; </a:t>
-            </a:r>
-            <a:r>
-              <a:rPr lang="en-US" sz="1400" dirty="0" err="1">
-                <a:solidFill>
-                  <a:srgbClr val="FF0000"/>
-                </a:solidFill>
-                <a:latin typeface="Courier New" panose="02070309020205020404" pitchFamily="49" charset="0"/>
-                <a:cs typeface="Courier New" panose="02070309020205020404" pitchFamily="49" charset="0"/>
-              </a:rPr>
-              <a:t>rs</a:t>
-            </a:r>
-            <a:r>
-              <a:rPr lang="en-US" sz="1400" dirty="0">
-                <a:solidFill>
-                  <a:srgbClr val="FF0000"/>
-                </a:solidFill>
-                <a:latin typeface="Courier New" panose="02070309020205020404" pitchFamily="49" charset="0"/>
-                <a:cs typeface="Courier New" panose="02070309020205020404" pitchFamily="49" charset="0"/>
-              </a:rPr>
-              <a:t>-&gt;</a:t>
-            </a:r>
-            <a:r>
-              <a:rPr lang="en-US" sz="1400" dirty="0" err="1" smtClean="0">
-                <a:solidFill>
-                  <a:srgbClr val="FF0000"/>
-                </a:solidFill>
-                <a:latin typeface="Courier New" panose="02070309020205020404" pitchFamily="49" charset="0"/>
-                <a:cs typeface="Courier New" panose="02070309020205020404" pitchFamily="49" charset="0"/>
-              </a:rPr>
-              <a:t>getInt</a:t>
-            </a:r>
-            <a:r>
-              <a:rPr lang="en-US" sz="1400" dirty="0" smtClean="0">
-                <a:solidFill>
-                  <a:srgbClr val="FF0000"/>
-                </a:solidFill>
-                <a:latin typeface="Courier New" panose="02070309020205020404" pitchFamily="49" charset="0"/>
-                <a:cs typeface="Courier New" panose="02070309020205020404" pitchFamily="49" charset="0"/>
-              </a:rPr>
-              <a:t>(1) </a:t>
-            </a:r>
-            <a:r>
-              <a:rPr lang="en-US" sz="1400" dirty="0">
-                <a:solidFill>
-                  <a:srgbClr val="FF0000"/>
-                </a:solidFill>
-                <a:latin typeface="Courier New" panose="02070309020205020404" pitchFamily="49" charset="0"/>
-                <a:cs typeface="Courier New" panose="02070309020205020404" pitchFamily="49" charset="0"/>
-              </a:rPr>
-              <a:t>&lt;&lt; " " &lt;&lt; </a:t>
-            </a:r>
-            <a:r>
-              <a:rPr lang="en-US" sz="1400" dirty="0" err="1">
-                <a:solidFill>
-                  <a:srgbClr val="FF0000"/>
-                </a:solidFill>
-                <a:latin typeface="Courier New" panose="02070309020205020404" pitchFamily="49" charset="0"/>
-                <a:cs typeface="Courier New" panose="02070309020205020404" pitchFamily="49" charset="0"/>
-              </a:rPr>
-              <a:t>rs</a:t>
-            </a:r>
-            <a:r>
-              <a:rPr lang="en-US" sz="1400" dirty="0">
-                <a:solidFill>
-                  <a:srgbClr val="FF0000"/>
-                </a:solidFill>
-                <a:latin typeface="Courier New" panose="02070309020205020404" pitchFamily="49" charset="0"/>
-                <a:cs typeface="Courier New" panose="02070309020205020404" pitchFamily="49" charset="0"/>
-              </a:rPr>
-              <a:t>-&gt;</a:t>
-            </a:r>
-            <a:r>
-              <a:rPr lang="en-US" sz="1400" dirty="0" err="1" smtClean="0">
-                <a:solidFill>
-                  <a:srgbClr val="FF0000"/>
-                </a:solidFill>
-                <a:latin typeface="Courier New" panose="02070309020205020404" pitchFamily="49" charset="0"/>
-                <a:cs typeface="Courier New" panose="02070309020205020404" pitchFamily="49" charset="0"/>
-              </a:rPr>
-              <a:t>getString</a:t>
-            </a:r>
-            <a:r>
-              <a:rPr lang="en-US" sz="1400" dirty="0" smtClean="0">
-                <a:solidFill>
-                  <a:srgbClr val="FF0000"/>
-                </a:solidFill>
-                <a:latin typeface="Courier New" panose="02070309020205020404" pitchFamily="49" charset="0"/>
-                <a:cs typeface="Courier New" panose="02070309020205020404" pitchFamily="49" charset="0"/>
-              </a:rPr>
-              <a:t>(2) </a:t>
-            </a:r>
-            <a:r>
-              <a:rPr lang="en-US" sz="1400" dirty="0">
-                <a:solidFill>
-                  <a:srgbClr val="FF0000"/>
-                </a:solidFill>
-                <a:latin typeface="Courier New" panose="02070309020205020404" pitchFamily="49" charset="0"/>
-                <a:cs typeface="Courier New" panose="02070309020205020404" pitchFamily="49" charset="0"/>
-              </a:rPr>
-              <a:t>&lt;&lt; </a:t>
+              <a:t>(2) &lt;&lt; </a:t>
             </a:r>
             <a:r>
               <a:rPr lang="en-US" sz="1400" dirty="0" err="1">
@@ -8449,7 +7781,7 @@
           <a:lstStyle/>
           <a:p>
             <a:r>
-              <a:rPr lang="en-US" dirty="0" smtClean="0"/>
+              <a:rPr lang="en-US" dirty="0"/>
               <a:t>Standard SQL Query </a:t>
             </a:r>
             <a:endParaRPr lang="en-CA" dirty="0"/>
@@ -8526,7 +7858,7 @@
           <a:lstStyle/>
           <a:p>
             <a:r>
-              <a:rPr lang="en-US" dirty="0" smtClean="0"/>
+              <a:rPr lang="en-US" dirty="0"/>
               <a:t>SQL Query with Parameters</a:t>
             </a:r>
             <a:endParaRPr lang="en-CA" dirty="0"/>
@@ -8603,11 +7935,11 @@
           <a:lstStyle/>
           <a:p>
             <a:r>
-              <a:rPr lang="en-US" dirty="0" err="1" smtClean="0"/>
+              <a:rPr lang="en-US" dirty="0" err="1"/>
               <a:t>getXXX</a:t>
             </a:r>
             <a:r>
-              <a:rPr lang="en-US" dirty="0" smtClean="0"/>
+              <a:rPr lang="en-US" dirty="0"/>
               <a:t>() Methods</a:t>
             </a:r>
             <a:endParaRPr lang="en-CA" dirty="0"/>
@@ -8662,7 +7994,7 @@
                     <a:lstStyle/>
                     <a:p>
                       <a:r>
-                        <a:rPr lang="en-US" dirty="0" smtClean="0"/>
+                        <a:rPr lang="en-US" dirty="0"/>
                         <a:t>Method</a:t>
                       </a:r>
                       <a:endParaRPr lang="en-CA" dirty="0"/>
@@ -8676,7 +8008,7 @@
                     <a:lstStyle/>
                     <a:p>
                       <a:r>
-                        <a:rPr lang="en-US" dirty="0" smtClean="0"/>
+                        <a:rPr lang="en-US" dirty="0"/>
                         <a:t>Description</a:t>
                       </a:r>
                       <a:endParaRPr lang="en-CA" dirty="0"/>
@@ -8697,14 +8029,13 @@
                     <a:lstStyle/>
                     <a:p>
                       <a:r>
-                        <a:rPr lang="en-CA" dirty="0" err="1" smtClean="0"/>
+                        <a:rPr lang="en-CA" dirty="0" err="1"/>
                         <a:t>getDate</a:t>
                       </a:r>
                       <a:r>
-                        <a:rPr lang="en-CA" dirty="0" smtClean="0"/>
+                        <a:rPr lang="en-CA" dirty="0"/>
                         <a:t>()</a:t>
                       </a:r>
-                      <a:endParaRPr lang="en-CA" dirty="0"/>
                     </a:p>
                   </a:txBody>
                   <a:tcPr/>
@@ -8715,7 +8046,7 @@
                     <a:lstStyle/>
                     <a:p>
                       <a:r>
-                        <a:rPr lang="en-US" dirty="0" smtClean="0"/>
+                        <a:rPr lang="en-US" dirty="0"/>
                         <a:t>Return the value of a parameter as a Date object</a:t>
                       </a:r>
                       <a:endParaRPr lang="en-CA" dirty="0"/>
@@ -8736,14 +8067,13 @@
                     <a:lstStyle/>
                     <a:p>
                       <a:r>
-                        <a:rPr lang="en-CA" dirty="0" err="1" smtClean="0"/>
+                        <a:rPr lang="en-CA" dirty="0" err="1"/>
                         <a:t>getDouble</a:t>
                       </a:r>
                       <a:r>
-                        <a:rPr lang="en-CA" dirty="0" smtClean="0"/>
+                        <a:rPr lang="en-CA" dirty="0"/>
                         <a:t>()</a:t>
                       </a:r>
-                      <a:endParaRPr lang="en-CA" dirty="0"/>
                     </a:p>
                   </a:txBody>
                   <a:tcPr/>
@@ -8754,10 +8084,9 @@
                     <a:lstStyle/>
                     <a:p>
                       <a:r>
-                        <a:rPr lang="en-US" dirty="0" smtClean="0"/>
+                        <a:rPr lang="en-US" dirty="0"/>
                         <a:t>Return the value of a parameter as a C++ double.</a:t>
                       </a:r>
-                      <a:endParaRPr lang="en-US" dirty="0"/>
                     </a:p>
                   </a:txBody>
                   <a:tcPr/>
@@ -8775,14 +8104,13 @@
                     <a:lstStyle/>
                     <a:p>
                       <a:r>
-                        <a:rPr lang="en-CA" dirty="0" err="1" smtClean="0"/>
+                        <a:rPr lang="en-CA" dirty="0" err="1"/>
                         <a:t>getFloat</a:t>
                       </a:r>
                       <a:r>
-                        <a:rPr lang="en-CA" dirty="0" smtClean="0"/>
+                        <a:rPr lang="en-CA" dirty="0"/>
                         <a:t>()</a:t>
                       </a:r>
-                      <a:endParaRPr lang="en-CA" dirty="0"/>
                     </a:p>
                   </a:txBody>
                   <a:tcPr/>
@@ -8793,7 +8121,7 @@
                     <a:lstStyle/>
                     <a:p>
                       <a:r>
-                        <a:rPr lang="en-US" dirty="0" smtClean="0"/>
+                        <a:rPr lang="en-US" dirty="0"/>
                         <a:t>Return the value of a parameter as a C++ float.</a:t>
                       </a:r>
                       <a:endParaRPr lang="en-CA" dirty="0"/>
@@ -8814,14 +8142,13 @@
                     <a:lstStyle/>
                     <a:p>
                       <a:r>
-                        <a:rPr lang="en-CA" dirty="0" err="1" smtClean="0"/>
+                        <a:rPr lang="en-CA" dirty="0" err="1"/>
                         <a:t>getInt</a:t>
                       </a:r>
                       <a:r>
-                        <a:rPr lang="en-CA" dirty="0" smtClean="0"/>
+                        <a:rPr lang="en-CA" dirty="0"/>
                         <a:t>()</a:t>
                       </a:r>
-                      <a:endParaRPr lang="en-CA" dirty="0"/>
                     </a:p>
                   </a:txBody>
                   <a:tcPr/>
@@ -8832,7 +8159,7 @@
                     <a:lstStyle/>
                     <a:p>
                       <a:r>
-                        <a:rPr lang="en-US" dirty="0" smtClean="0"/>
+                        <a:rPr lang="en-US" dirty="0"/>
                         <a:t>Return the value of a parameter as a C++ int.</a:t>
                       </a:r>
                       <a:endParaRPr lang="en-CA" dirty="0"/>
@@ -8853,14 +8180,13 @@
                     <a:lstStyle/>
                     <a:p>
                       <a:r>
-                        <a:rPr lang="en-CA" dirty="0" err="1" smtClean="0"/>
+                        <a:rPr lang="en-CA" dirty="0" err="1"/>
                         <a:t>getNumber</a:t>
                       </a:r>
                       <a:r>
-                        <a:rPr lang="en-CA" dirty="0" smtClean="0"/>
+                        <a:rPr lang="en-CA" dirty="0"/>
                         <a:t>()</a:t>
                       </a:r>
-                      <a:endParaRPr lang="en-CA" dirty="0"/>
                     </a:p>
                   </a:txBody>
                   <a:tcPr/>
@@ -8871,7 +8197,7 @@
                     <a:lstStyle/>
                     <a:p>
                       <a:r>
-                        <a:rPr lang="en-US" dirty="0" smtClean="0"/>
+                        <a:rPr lang="en-US" dirty="0"/>
                         <a:t>Return the value of a parameter as a Number object.</a:t>
                       </a:r>
                       <a:endParaRPr lang="en-CA" dirty="0"/>
@@ -8892,14 +8218,13 @@
                     <a:lstStyle/>
                     <a:p>
                       <a:r>
-                        <a:rPr lang="en-CA" dirty="0" err="1" smtClean="0"/>
+                        <a:rPr lang="en-CA" dirty="0" err="1"/>
                         <a:t>getString</a:t>
                       </a:r>
                       <a:r>
-                        <a:rPr lang="en-CA" dirty="0" smtClean="0"/>
+                        <a:rPr lang="en-CA" dirty="0"/>
                         <a:t>()</a:t>
                       </a:r>
-                      <a:endParaRPr lang="en-CA" dirty="0"/>
                     </a:p>
                   </a:txBody>
                   <a:tcPr/>
@@ -8910,7 +8235,7 @@
                     <a:lstStyle/>
                     <a:p>
                       <a:r>
-                        <a:rPr lang="en-US" dirty="0" smtClean="0"/>
+                        <a:rPr lang="en-US" dirty="0"/>
                         <a:t>Return the value of the parameter as a string.</a:t>
                       </a:r>
                       <a:endParaRPr lang="en-CA" dirty="0"/>
@@ -9040,7 +8365,7 @@
             <a:endParaRPr lang="en-US" dirty="0"/>
           </a:p>
           <a:p>
-            <a:endParaRPr lang="en-US" dirty="0" smtClean="0"/>
+            <a:endParaRPr lang="en-US" dirty="0"/>
           </a:p>
         </p:txBody>
       </p:sp>
@@ -9094,10 +8419,9 @@
               <a:t>isNull</a:t>
             </a:r>
             <a:r>
-              <a:rPr lang="en-CA" dirty="0" smtClean="0"/>
+              <a:rPr lang="en-CA" dirty="0"/>
               <a:t>() Method</a:t>
             </a:r>
-            <a:endParaRPr lang="en-CA" dirty="0"/>
           </a:p>
         </p:txBody>
       </p:sp>
@@ -9117,12 +8441,8 @@
           <a:lstStyle/>
           <a:p>
             <a:r>
-              <a:rPr lang="en-US" dirty="0" smtClean="0"/>
-              <a:t>Checks </a:t>
-            </a:r>
-            <a:r>
               <a:rPr lang="en-US" dirty="0"/>
-              <a:t>whether the parameter is null.</a:t>
+              <a:t>Checks whether the parameter is null.</a:t>
             </a:r>
             <a:endParaRPr lang="en-CA" dirty="0"/>
           </a:p>
@@ -9199,14 +8519,10 @@
           <a:p>
             <a:r>
               <a:rPr lang="en-US" dirty="0" err="1"/>
-              <a:t>s</a:t>
-            </a:r>
-            <a:r>
-              <a:rPr lang="en-US" dirty="0" err="1" smtClean="0"/>
-              <a:t>etXXX</a:t>
-            </a:r>
-            <a:r>
-              <a:rPr lang="en-US" dirty="0" smtClean="0"/>
+              <a:t>setXXX</a:t>
+            </a:r>
+            <a:r>
+              <a:rPr lang="en-US" dirty="0"/>
               <a:t>() Methods</a:t>
             </a:r>
             <a:endParaRPr lang="en-CA" dirty="0"/>
@@ -9261,7 +8577,7 @@
                     <a:lstStyle/>
                     <a:p>
                       <a:r>
-                        <a:rPr lang="en-US" dirty="0" smtClean="0"/>
+                        <a:rPr lang="en-US" dirty="0"/>
                         <a:t>Method</a:t>
                       </a:r>
                       <a:endParaRPr lang="en-CA" dirty="0"/>
@@ -9275,7 +8591,7 @@
                     <a:lstStyle/>
                     <a:p>
                       <a:r>
-                        <a:rPr lang="en-US" dirty="0" smtClean="0"/>
+                        <a:rPr lang="en-US" dirty="0"/>
                         <a:t>Description</a:t>
                       </a:r>
                       <a:endParaRPr lang="en-CA" dirty="0"/>
@@ -9296,14 +8612,13 @@
                     <a:lstStyle/>
                     <a:p>
                       <a:r>
-                        <a:rPr lang="en-CA" dirty="0" err="1" smtClean="0"/>
+                        <a:rPr lang="en-CA" dirty="0" err="1"/>
                         <a:t>setDate</a:t>
                       </a:r>
                       <a:r>
-                        <a:rPr lang="en-CA" dirty="0" smtClean="0"/>
+                        <a:rPr lang="en-CA" dirty="0"/>
                         <a:t>()</a:t>
                       </a:r>
-                      <a:endParaRPr lang="en-CA" dirty="0"/>
                     </a:p>
                   </a:txBody>
                   <a:tcPr/>
@@ -9314,7 +8629,7 @@
                     <a:lstStyle/>
                     <a:p>
                       <a:r>
-                        <a:rPr lang="en-US" dirty="0" smtClean="0"/>
+                        <a:rPr lang="en-US" dirty="0"/>
                         <a:t>Set a parameter to a Date value.</a:t>
                       </a:r>
                       <a:endParaRPr lang="en-CA" dirty="0"/>
@@ -9335,14 +8650,13 @@
                     <a:lstStyle/>
                     <a:p>
                       <a:r>
-                        <a:rPr lang="en-CA" dirty="0" err="1" smtClean="0"/>
+                        <a:rPr lang="en-CA" dirty="0" err="1"/>
                         <a:t>setDouble</a:t>
                       </a:r>
                       <a:r>
-                        <a:rPr lang="en-CA" dirty="0" smtClean="0"/>
+                        <a:rPr lang="en-CA" dirty="0"/>
                         <a:t>()</a:t>
                       </a:r>
-                      <a:endParaRPr lang="en-CA" dirty="0"/>
                     </a:p>
                   </a:txBody>
                   <a:tcPr/>
@@ -9353,7 +8667,7 @@
                     <a:lstStyle/>
                     <a:p>
                       <a:r>
-                        <a:rPr lang="en-US" dirty="0" smtClean="0"/>
+                        <a:rPr lang="en-US" dirty="0"/>
                         <a:t>Set a parameter to a C++ double value.</a:t>
                       </a:r>
                       <a:endParaRPr lang="en-CA" dirty="0"/>
@@ -9374,14 +8688,13 @@
                     <a:lstStyle/>
                     <a:p>
                       <a:r>
-                        <a:rPr lang="en-CA" dirty="0" err="1" smtClean="0"/>
+                        <a:rPr lang="en-CA" dirty="0" err="1"/>
                         <a:t>setFloat</a:t>
                       </a:r>
                       <a:r>
-                        <a:rPr lang="en-CA" dirty="0" smtClean="0"/>
+                        <a:rPr lang="en-CA" dirty="0"/>
                         <a:t>()</a:t>
                       </a:r>
-                      <a:endParaRPr lang="en-CA" dirty="0"/>
                     </a:p>
                   </a:txBody>
                   <a:tcPr/>
@@ -9392,10 +8705,9 @@
                     <a:lstStyle/>
                     <a:p>
                       <a:r>
-                        <a:rPr lang="en-US" dirty="0" smtClean="0"/>
+                        <a:rPr lang="en-US" dirty="0"/>
                         <a:t>Set a parameter to a C++ float value.</a:t>
                       </a:r>
-                      <a:endParaRPr lang="en-US" dirty="0"/>
                     </a:p>
                   </a:txBody>
                   <a:tcPr/>
@@ -9413,14 +8725,13 @@
                     <a:lstStyle/>
                     <a:p>
                       <a:r>
-                        <a:rPr lang="en-CA" dirty="0" err="1" smtClean="0"/>
+                        <a:rPr lang="en-CA" dirty="0" err="1"/>
                         <a:t>setInt</a:t>
                       </a:r>
                       <a:r>
-                        <a:rPr lang="en-CA" dirty="0" smtClean="0"/>
+                        <a:rPr lang="en-CA" dirty="0"/>
                         <a:t>()</a:t>
                       </a:r>
-                      <a:endParaRPr lang="en-CA" dirty="0"/>
                     </a:p>
                   </a:txBody>
                   <a:tcPr/>
@@ -9431,15 +8742,15 @@
                     <a:lstStyle/>
                     <a:p>
                       <a:r>
-                        <a:rPr lang="en-US" dirty="0" smtClean="0"/>
+                        <a:rPr lang="en-US" dirty="0"/>
                         <a:t>Set a parameter to a C++ </a:t>
                       </a:r>
                       <a:r>
-                        <a:rPr lang="en-US" dirty="0" err="1" smtClean="0"/>
+                        <a:rPr lang="en-US" dirty="0" err="1"/>
                         <a:t>int</a:t>
                       </a:r>
                       <a:r>
-                        <a:rPr lang="en-US" dirty="0" smtClean="0"/>
+                        <a:rPr lang="en-US" dirty="0"/>
                         <a:t> value.</a:t>
                       </a:r>
                       <a:endParaRPr lang="en-CA" dirty="0"/>
@@ -9460,14 +8771,13 @@
                     <a:lstStyle/>
                     <a:p>
                       <a:r>
-                        <a:rPr lang="en-CA" dirty="0" err="1" smtClean="0"/>
+                        <a:rPr lang="en-CA" dirty="0" err="1"/>
                         <a:t>setNull</a:t>
                       </a:r>
                       <a:r>
-                        <a:rPr lang="en-CA" dirty="0" smtClean="0"/>
+                        <a:rPr lang="en-CA" dirty="0"/>
                         <a:t>()</a:t>
                       </a:r>
-                      <a:endParaRPr lang="en-CA" dirty="0"/>
                     </a:p>
                   </a:txBody>
                   <a:tcPr/>
@@ -9478,7 +8788,7 @@
                     <a:lstStyle/>
                     <a:p>
                       <a:r>
-                        <a:rPr lang="en-US" dirty="0" smtClean="0"/>
+                        <a:rPr lang="en-US" dirty="0"/>
                         <a:t>Set a parameter to SQL null.</a:t>
                       </a:r>
                       <a:endParaRPr lang="en-CA" dirty="0"/>
@@ -9499,14 +8809,13 @@
                     <a:lstStyle/>
                     <a:p>
                       <a:r>
-                        <a:rPr lang="en-CA" dirty="0" err="1" smtClean="0"/>
+                        <a:rPr lang="en-CA" dirty="0" err="1"/>
                         <a:t>setNumber</a:t>
                       </a:r>
                       <a:r>
-                        <a:rPr lang="en-CA" dirty="0" smtClean="0"/>
+                        <a:rPr lang="en-CA" dirty="0"/>
                         <a:t>()</a:t>
                       </a:r>
-                      <a:endParaRPr lang="en-CA" dirty="0"/>
                     </a:p>
                   </a:txBody>
                   <a:tcPr/>
@@ -9517,7 +8826,7 @@
                     <a:lstStyle/>
                     <a:p>
                       <a:r>
-                        <a:rPr lang="en-US" dirty="0" smtClean="0"/>
+                        <a:rPr lang="en-US" dirty="0"/>
                         <a:t>Set a parameter to a Number value.</a:t>
                       </a:r>
                       <a:endParaRPr lang="en-CA" dirty="0"/>
@@ -9538,14 +8847,13 @@
                     <a:lstStyle/>
                     <a:p>
                       <a:r>
-                        <a:rPr lang="en-CA" dirty="0" err="1" smtClean="0"/>
+                        <a:rPr lang="en-CA" dirty="0" err="1"/>
                         <a:t>setString</a:t>
                       </a:r>
                       <a:r>
-                        <a:rPr lang="en-CA" dirty="0" smtClean="0"/>
+                        <a:rPr lang="en-CA" dirty="0"/>
                         <a:t>()</a:t>
                       </a:r>
-                      <a:endParaRPr lang="en-CA" dirty="0"/>
                     </a:p>
                   </a:txBody>
                   <a:tcPr/>
@@ -9556,7 +8864,7 @@
                     <a:lstStyle/>
                     <a:p>
                       <a:r>
-                        <a:rPr lang="en-US" dirty="0" smtClean="0"/>
+                        <a:rPr lang="en-US" dirty="0"/>
                         <a:t>Set a parameter to an string value.</a:t>
                       </a:r>
                       <a:endParaRPr lang="en-CA" dirty="0"/>
@@ -9620,7 +8928,7 @@
           <a:lstStyle/>
           <a:p>
             <a:r>
-              <a:rPr lang="en-US" dirty="0" smtClean="0"/>
+              <a:rPr lang="en-US" dirty="0"/>
               <a:t>Transactions</a:t>
             </a:r>
             <a:endParaRPr lang="en-CA" dirty="0"/>
@@ -9643,28 +8951,28 @@
           <a:lstStyle/>
           <a:p>
             <a:r>
-              <a:rPr lang="en-US" dirty="0" smtClean="0"/>
+              <a:rPr lang="en-US" dirty="0"/>
               <a:t>Changes by DDL statements become permanent after committing the transaction or reversed by rollback.</a:t>
             </a:r>
           </a:p>
           <a:p>
             <a:r>
-              <a:rPr lang="en-US" dirty="0" smtClean="0"/>
+              <a:rPr lang="en-US" dirty="0"/>
               <a:t>Commit and Rollback commands can be execute when using </a:t>
             </a:r>
             <a:r>
-              <a:rPr lang="en-US" dirty="0" err="1" smtClean="0"/>
+              <a:rPr lang="en-US" dirty="0" err="1"/>
               <a:t>executeUpdate</a:t>
             </a:r>
             <a:r>
-              <a:rPr lang="en-US" dirty="0" smtClean="0"/>
+              <a:rPr lang="en-US" dirty="0"/>
               <a:t>().</a:t>
             </a:r>
           </a:p>
           <a:p>
             <a:pPr lvl="1"/>
             <a:r>
-              <a:rPr lang="en-US" dirty="0" smtClean="0">
+              <a:rPr lang="en-US" dirty="0">
                 <a:latin typeface="Courier New" panose="02070309020205020404" pitchFamily="49" charset="0"/>
                 <a:cs typeface="Courier New" panose="02070309020205020404" pitchFamily="49" charset="0"/>
               </a:rPr>
@@ -9674,7 +8982,7 @@
           <a:p>
             <a:pPr lvl="1"/>
             <a:r>
-              <a:rPr lang="en-US" dirty="0" smtClean="0">
+              <a:rPr lang="en-US" dirty="0">
                 <a:latin typeface="Courier New" panose="02070309020205020404" pitchFamily="49" charset="0"/>
                 <a:cs typeface="Courier New" panose="02070309020205020404" pitchFamily="49" charset="0"/>
               </a:rPr>
@@ -9683,7 +8991,7 @@
           </a:p>
           <a:p>
             <a:r>
-              <a:rPr lang="en-US" dirty="0" smtClean="0"/>
+              <a:rPr lang="en-US" dirty="0"/>
               <a:t>To make changes of DML statements permanent immediately, execute the following command:</a:t>
             </a:r>
           </a:p>
@@ -9710,19 +9018,12 @@
                 <a:latin typeface="Courier New" panose="02070309020205020404" pitchFamily="49" charset="0"/>
                 <a:cs typeface="Courier New" panose="02070309020205020404" pitchFamily="49" charset="0"/>
               </a:rPr>
-              <a:t>(TRUE</a:t>
-            </a:r>
-            <a:r>
-              <a:rPr lang="en-CA" dirty="0" smtClean="0">
-                <a:latin typeface="Courier New" panose="02070309020205020404" pitchFamily="49" charset="0"/>
-                <a:cs typeface="Courier New" panose="02070309020205020404" pitchFamily="49" charset="0"/>
-              </a:rPr>
-              <a:t>);</a:t>
-            </a:r>
-          </a:p>
-          <a:p>
-            <a:r>
-              <a:rPr lang="en-US" dirty="0" smtClean="0"/>
+              <a:t>(TRUE);</a:t>
+            </a:r>
+          </a:p>
+          <a:p>
+            <a:r>
+              <a:rPr lang="en-US" dirty="0"/>
               <a:t>To set the auto commit off:</a:t>
             </a:r>
           </a:p>
@@ -9752,7 +9053,7 @@
               <a:t>(FALSE);</a:t>
             </a:r>
             <a:r>
-              <a:rPr lang="en-US" dirty="0" smtClean="0">
+              <a:rPr lang="en-US" dirty="0">
                 <a:latin typeface="Courier New" panose="02070309020205020404" pitchFamily="49" charset="0"/>
                 <a:cs typeface="Courier New" panose="02070309020205020404" pitchFamily="49" charset="0"/>
               </a:rPr>
@@ -9761,7 +9062,7 @@
           </a:p>
           <a:p>
             <a:pPr lvl="1"/>
-            <a:endParaRPr lang="en-US" dirty="0" smtClean="0"/>
+            <a:endParaRPr lang="en-US" dirty="0"/>
           </a:p>
           <a:p>
             <a:pPr lvl="1"/>
@@ -9837,15 +9138,15 @@
           <a:lstStyle/>
           <a:p>
             <a:r>
-              <a:rPr lang="en-US" dirty="0" smtClean="0"/>
+              <a:rPr lang="en-US" dirty="0"/>
               <a:t>OCCI methods generates exceptions of type </a:t>
             </a:r>
             <a:r>
-              <a:rPr lang="en-US" i="1" dirty="0" err="1" smtClean="0"/>
+              <a:rPr lang="en-US" i="1" dirty="0" err="1"/>
               <a:t>SQLException</a:t>
             </a:r>
             <a:r>
-              <a:rPr lang="en-US" dirty="0" smtClean="0"/>
+              <a:rPr lang="en-US" dirty="0"/>
               <a:t> if they are unsuccessful.</a:t>
             </a:r>
           </a:p>
@@ -9861,17 +9162,13 @@
             </a:r>
             <a:r>
               <a:rPr lang="en-US" dirty="0"/>
-              <a:t> class contains Oracle specific error numbers and messages</a:t>
-            </a:r>
-            <a:r>
-              <a:rPr lang="en-US" dirty="0" smtClean="0"/>
-              <a:t>.</a:t>
+              <a:t> class contains Oracle specific error numbers and messages.</a:t>
             </a:r>
           </a:p>
           <a:p>
             <a:pPr lvl="1"/>
             <a:r>
-              <a:rPr lang="en-US" dirty="0" smtClean="0"/>
+              <a:rPr lang="en-US" dirty="0"/>
               <a:t>The error message can be obtained by the </a:t>
             </a:r>
             <a:r>
@@ -9880,11 +9177,7 @@
             </a:r>
             <a:r>
               <a:rPr lang="en-CA" dirty="0"/>
-              <a:t> </a:t>
-            </a:r>
-            <a:r>
-              <a:rPr lang="en-CA" dirty="0" smtClean="0"/>
-              <a:t>or </a:t>
+              <a:t> or </a:t>
             </a:r>
             <a:r>
               <a:rPr lang="en-CA" dirty="0" err="1"/>
@@ -9892,18 +9185,14 @@
             </a:r>
             <a:r>
               <a:rPr lang="en-CA" dirty="0"/>
-              <a:t>() </a:t>
-            </a:r>
-            <a:r>
-              <a:rPr lang="en-CA" dirty="0" smtClean="0"/>
-              <a:t>method.</a:t>
-            </a:r>
-            <a:endParaRPr lang="en-US" dirty="0" smtClean="0"/>
+              <a:t>() method.</a:t>
+            </a:r>
+            <a:endParaRPr lang="en-US" dirty="0"/>
           </a:p>
           <a:p>
             <a:pPr lvl="1"/>
             <a:r>
-              <a:rPr lang="en-US" dirty="0" smtClean="0"/>
+              <a:rPr lang="en-US" dirty="0"/>
               <a:t>The </a:t>
             </a:r>
             <a:r>
@@ -9911,24 +9200,24 @@
               <a:t>getErrorCode</a:t>
             </a:r>
             <a:r>
-              <a:rPr lang="en-CA" dirty="0" smtClean="0"/>
+              <a:rPr lang="en-CA" dirty="0"/>
               <a:t>() returns the </a:t>
             </a:r>
             <a:r>
-              <a:rPr lang="en-CA" dirty="0" err="1" smtClean="0"/>
+              <a:rPr lang="en-CA" dirty="0" err="1"/>
               <a:t>Orcale</a:t>
             </a:r>
             <a:r>
-              <a:rPr lang="en-CA" dirty="0" smtClean="0"/>
+              <a:rPr lang="en-CA" dirty="0"/>
               <a:t> error code.</a:t>
             </a:r>
           </a:p>
           <a:p>
             <a:r>
-              <a:rPr lang="en-US" dirty="0" smtClean="0"/>
+              <a:rPr lang="en-US" dirty="0"/>
               <a:t>See the following examples:</a:t>
             </a:r>
-            <a:endParaRPr lang="en-CA" dirty="0" smtClean="0"/>
+            <a:endParaRPr lang="en-CA" dirty="0"/>
           </a:p>
         </p:txBody>
       </p:sp>
@@ -10356,39 +9645,23 @@
           <a:p>
             <a:r>
               <a:rPr lang="en-US" dirty="0"/>
-              <a:t>All OCCI processing takes place inside the Environment class</a:t>
-            </a:r>
-            <a:r>
-              <a:rPr lang="en-US" dirty="0" smtClean="0"/>
-              <a:t>.</a:t>
+              <a:t>All OCCI processing takes place inside the Environment class.</a:t>
             </a:r>
           </a:p>
           <a:p>
             <a:r>
               <a:rPr lang="en-CA" dirty="0"/>
-              <a:t>An OCCI </a:t>
-            </a:r>
-            <a:r>
-              <a:rPr lang="en-CA" dirty="0" smtClean="0"/>
-              <a:t>environment </a:t>
-            </a:r>
-            <a:r>
-              <a:rPr lang="en-US" dirty="0" smtClean="0"/>
-              <a:t>provides </a:t>
+              <a:t>An OCCI environment </a:t>
             </a:r>
             <a:r>
               <a:rPr lang="en-US" dirty="0"/>
-              <a:t>application modes and user-specified memory management functions</a:t>
-            </a:r>
-            <a:r>
-              <a:rPr lang="en-US" dirty="0" smtClean="0"/>
-              <a:t>.</a:t>
+              <a:t>provides application modes and user-specified memory management functions.</a:t>
             </a:r>
             <a:endParaRPr lang="en-CA" dirty="0"/>
           </a:p>
           <a:p>
             <a:r>
-              <a:rPr lang="en-US" dirty="0" smtClean="0"/>
+              <a:rPr lang="en-US" dirty="0"/>
               <a:t>To create an OCCI environment</a:t>
             </a:r>
           </a:p>
@@ -10437,7 +9710,7 @@
               <a:t>createEnvironment</a:t>
             </a:r>
             <a:r>
-              <a:rPr lang="en-CA" dirty="0" smtClean="0">
+              <a:rPr lang="en-CA" dirty="0">
                 <a:solidFill>
                   <a:srgbClr val="FF0000"/>
                 </a:solidFill>
@@ -10457,7 +9730,7 @@
               <a:t>xxx</a:t>
             </a:r>
             <a:r>
-              <a:rPr lang="en-CA" dirty="0" smtClean="0"/>
+              <a:rPr lang="en-CA" dirty="0"/>
               <a:t>() methods are used to create OCCI objects such as</a:t>
             </a:r>
           </a:p>
@@ -10465,23 +9738,19 @@
             <a:pPr lvl="1"/>
             <a:r>
               <a:rPr lang="en-US" dirty="0"/>
-              <a:t>c</a:t>
-            </a:r>
-            <a:r>
-              <a:rPr lang="en-US" dirty="0" smtClean="0"/>
-              <a:t>onnections</a:t>
+              <a:t>connections</a:t>
             </a:r>
           </a:p>
           <a:p>
             <a:pPr lvl="1"/>
             <a:r>
-              <a:rPr lang="en-US" dirty="0" smtClean="0"/>
+              <a:rPr lang="en-US" dirty="0"/>
               <a:t>Statements</a:t>
             </a:r>
           </a:p>
           <a:p>
             <a:r>
-              <a:rPr lang="en-US" dirty="0" smtClean="0"/>
+              <a:rPr lang="en-US" dirty="0"/>
               <a:t>At the end of your program, you need to terminate the OCCI environment:</a:t>
             </a:r>
           </a:p>
@@ -10629,23 +9898,19 @@
             </a:r>
             <a:r>
               <a:rPr lang="en-US" dirty="0"/>
-              <a:t> objects</a:t>
-            </a:r>
-            <a:r>
-              <a:rPr lang="en-US" dirty="0" smtClean="0"/>
-              <a:t>.</a:t>
+              <a:t> objects.</a:t>
             </a:r>
           </a:p>
           <a:p>
             <a:pPr lvl="1"/>
             <a:r>
-              <a:rPr lang="en-US" dirty="0" smtClean="0"/>
+              <a:rPr lang="en-US" dirty="0"/>
               <a:t>Before creating a connection, you need to create the environment.</a:t>
             </a:r>
           </a:p>
           <a:p>
             <a:r>
-              <a:rPr lang="en-US" dirty="0" smtClean="0"/>
+              <a:rPr lang="en-US" dirty="0"/>
               <a:t>Use an environment instance to create a connection:</a:t>
             </a:r>
           </a:p>
@@ -10749,16 +10014,6 @@
               <a:t>createConnection</a:t>
             </a:r>
             <a:r>
-              <a:rPr lang="en-CA" sz="1200" dirty="0" smtClean="0">
-                <a:solidFill>
-                  <a:srgbClr val="FF0000"/>
-                </a:solidFill>
-                <a:latin typeface="Courier New" panose="02070309020205020404" pitchFamily="49" charset="0"/>
-                <a:cs typeface="Courier New" panose="02070309020205020404" pitchFamily="49" charset="0"/>
-              </a:rPr>
-              <a:t>("username", </a:t>
-            </a:r>
-            <a:r>
               <a:rPr lang="en-CA" sz="1200" dirty="0">
                 <a:solidFill>
                   <a:srgbClr val="FF0000"/>
@@ -10766,10 +10021,10 @@
                 <a:latin typeface="Courier New" panose="02070309020205020404" pitchFamily="49" charset="0"/>
                 <a:cs typeface="Courier New" panose="02070309020205020404" pitchFamily="49" charset="0"/>
               </a:rPr>
-              <a:t>"</a:t>
-            </a:r>
-            <a:r>
-              <a:rPr lang="en-CA" sz="1200" i="1" dirty="0" smtClean="0">
+              <a:t>("username", "</a:t>
+            </a:r>
+            <a:r>
+              <a:rPr lang="en-CA" sz="1200" i="1" dirty="0">
                 <a:solidFill>
                   <a:srgbClr val="FF0000"/>
                 </a:solidFill>
@@ -10786,42 +10041,12 @@
                 <a:latin typeface="Courier New" panose="02070309020205020404" pitchFamily="49" charset="0"/>
                 <a:cs typeface="Courier New" panose="02070309020205020404" pitchFamily="49" charset="0"/>
               </a:rPr>
-              <a:t> </a:t>
-            </a:r>
-            <a:r>
-              <a:rPr lang="en-CA" sz="1200" dirty="0" smtClean="0">
-                <a:solidFill>
-                  <a:srgbClr val="FF0000"/>
-                </a:solidFill>
-                <a:latin typeface="Courier New" panose="02070309020205020404" pitchFamily="49" charset="0"/>
-                <a:cs typeface="Courier New" panose="02070309020205020404" pitchFamily="49" charset="0"/>
-              </a:rPr>
-              <a:t>",</a:t>
-            </a:r>
-            <a:r>
-              <a:rPr lang="en-CA" sz="1200" dirty="0">
-                <a:solidFill>
-                  <a:srgbClr val="FF0000"/>
-                </a:solidFill>
-                <a:latin typeface="Courier New" panose="02070309020205020404" pitchFamily="49" charset="0"/>
-                <a:cs typeface="Courier New" panose="02070309020205020404" pitchFamily="49" charset="0"/>
-              </a:rPr>
-              <a:t> </a:t>
-            </a:r>
-            <a:r>
-              <a:rPr lang="en-CA" sz="1200" dirty="0" smtClean="0">
-                <a:solidFill>
-                  <a:srgbClr val="FF0000"/>
-                </a:solidFill>
-                <a:latin typeface="Courier New" panose="02070309020205020404" pitchFamily="49" charset="0"/>
-                <a:cs typeface="Courier New" panose="02070309020205020404" pitchFamily="49" charset="0"/>
-              </a:rPr>
-              <a:t>"Connection String");</a:t>
-            </a:r>
-          </a:p>
-          <a:p>
-            <a:r>
-              <a:rPr lang="en-US" dirty="0" smtClean="0"/>
+              <a:t> ", "Connection String");</a:t>
+            </a:r>
+          </a:p>
+          <a:p>
+            <a:r>
+              <a:rPr lang="en-US" dirty="0"/>
               <a:t>You must terminate a connection at the end of the session.</a:t>
             </a:r>
           </a:p>
@@ -10978,7 +10203,7 @@
           <a:lstStyle/>
           <a:p>
             <a:r>
-              <a:rPr lang="en-US" dirty="0" smtClean="0"/>
+              <a:rPr lang="en-US" dirty="0"/>
               <a:t>Creating a Database Connection</a:t>
             </a:r>
             <a:endParaRPr lang="en-CA" dirty="0"/>
@@ -11149,25 +10374,21 @@
           <a:lstStyle/>
           <a:p>
             <a:r>
-              <a:rPr lang="en-US" dirty="0" smtClean="0"/>
+              <a:rPr lang="en-US" dirty="0"/>
               <a:t>The </a:t>
             </a:r>
             <a:r>
               <a:rPr lang="en-US" i="1" dirty="0"/>
-              <a:t>S</a:t>
-            </a:r>
-            <a:r>
-              <a:rPr lang="en-US" i="1" dirty="0" smtClean="0"/>
-              <a:t>tatement</a:t>
-            </a:r>
-            <a:r>
-              <a:rPr lang="en-US" dirty="0" smtClean="0"/>
+              <a:t>Statement</a:t>
+            </a:r>
+            <a:r>
+              <a:rPr lang="en-US" dirty="0"/>
               <a:t> class is used to execute SQL commands.</a:t>
             </a:r>
           </a:p>
           <a:p>
             <a:r>
-              <a:rPr lang="en-US" dirty="0" smtClean="0"/>
+              <a:rPr lang="en-US" dirty="0"/>
               <a:t>To create a statement objects:</a:t>
             </a:r>
           </a:p>
@@ -11274,12 +10495,8 @@
           <a:lstStyle/>
           <a:p>
             <a:r>
-              <a:rPr lang="en-US" dirty="0" smtClean="0"/>
-              <a:t>Execute </a:t>
-            </a:r>
-            <a:r>
               <a:rPr lang="en-US" dirty="0"/>
-              <a:t>SQL Commands</a:t>
+              <a:t>Execute SQL Commands</a:t>
             </a:r>
             <a:endParaRPr lang="en-CA" dirty="0"/>
           </a:p>
@@ -11303,14 +10520,14 @@
           <a:lstStyle/>
           <a:p>
             <a:r>
-              <a:rPr lang="en-US" dirty="0" smtClean="0"/>
+              <a:rPr lang="en-US" dirty="0"/>
               <a:t>After creating the statement object, the following methods can be called to execute SQL commands:</a:t>
             </a:r>
           </a:p>
           <a:p>
             <a:pPr lvl="1"/>
             <a:r>
-              <a:rPr lang="en-US" dirty="0" smtClean="0"/>
+              <a:rPr lang="en-US" dirty="0"/>
               <a:t>execute() </a:t>
             </a:r>
           </a:p>
@@ -11320,16 +10537,15 @@
               <a:rPr lang="en-US" dirty="0"/>
               <a:t>executes all nonspecific statement types</a:t>
             </a:r>
-            <a:endParaRPr lang="en-US" dirty="0" smtClean="0"/>
           </a:p>
           <a:p>
             <a:pPr lvl="1"/>
             <a:r>
-              <a:rPr lang="en-US" dirty="0" err="1" smtClean="0"/>
+              <a:rPr lang="en-US" dirty="0" err="1"/>
               <a:t>executeUpdate</a:t>
             </a:r>
             <a:r>
-              <a:rPr lang="en-US" dirty="0" smtClean="0"/>
+              <a:rPr lang="en-US" dirty="0"/>
               <a:t>()</a:t>
             </a:r>
           </a:p>
@@ -11339,16 +10555,15 @@
               <a:rPr lang="en-US" dirty="0"/>
               <a:t>executes DML and DDL statements</a:t>
             </a:r>
-            <a:endParaRPr lang="en-US" dirty="0" smtClean="0"/>
           </a:p>
           <a:p>
             <a:pPr lvl="1"/>
             <a:r>
-              <a:rPr lang="en-US" dirty="0" err="1" smtClean="0"/>
+              <a:rPr lang="en-US" dirty="0" err="1"/>
               <a:t>executeArrayUpdate</a:t>
             </a:r>
             <a:r>
-              <a:rPr lang="en-US" dirty="0" smtClean="0"/>
+              <a:rPr lang="en-US" dirty="0"/>
               <a:t>() </a:t>
             </a:r>
           </a:p>
@@ -11358,38 +10573,33 @@
               <a:rPr lang="en-CA" dirty="0"/>
               <a:t>executes multiple DML statements</a:t>
             </a:r>
-            <a:endParaRPr lang="en-US" dirty="0" smtClean="0"/>
+            <a:endParaRPr lang="en-US" dirty="0"/>
           </a:p>
           <a:p>
             <a:pPr lvl="1"/>
             <a:r>
-              <a:rPr lang="en-US" dirty="0" err="1" smtClean="0"/>
+              <a:rPr lang="en-US" dirty="0" err="1"/>
               <a:t>executeQuery</a:t>
             </a:r>
             <a:r>
-              <a:rPr lang="en-US" dirty="0" smtClean="0"/>
+              <a:rPr lang="en-US" dirty="0"/>
               <a:t>()</a:t>
             </a:r>
             <a:r>
               <a:rPr lang="en-CA" dirty="0"/>
               <a:t>	</a:t>
             </a:r>
-            <a:endParaRPr lang="en-CA" dirty="0" smtClean="0"/>
           </a:p>
           <a:p>
             <a:pPr lvl="2"/>
             <a:r>
               <a:rPr lang="en-CA" dirty="0"/>
-              <a:t>executes a </a:t>
-            </a:r>
-            <a:r>
-              <a:rPr lang="en-CA" dirty="0" smtClean="0"/>
-              <a:t>query</a:t>
-            </a:r>
-          </a:p>
-          <a:p>
-            <a:r>
-              <a:rPr lang="en-US" dirty="0" smtClean="0"/>
+              <a:t>executes a query</a:t>
+            </a:r>
+          </a:p>
+          <a:p>
+            <a:r>
+              <a:rPr lang="en-US" dirty="0"/>
               <a:t>To creates a table in a database:</a:t>
             </a:r>
           </a:p>
@@ -11435,17 +10645,108 @@
                 <a:latin typeface="Courier New" panose="02070309020205020404" pitchFamily="49" charset="0"/>
                 <a:cs typeface="Courier New" panose="02070309020205020404" pitchFamily="49" charset="0"/>
               </a:rPr>
-              <a:t>("CREATE TABLE </a:t>
-            </a:r>
-            <a:r>
-              <a:rPr lang="en-US" dirty="0" smtClean="0">
-                <a:solidFill>
-                  <a:srgbClr val="FF0000"/>
-                </a:solidFill>
-                <a:latin typeface="Courier New" panose="02070309020205020404" pitchFamily="49" charset="0"/>
-                <a:cs typeface="Courier New" panose="02070309020205020404" pitchFamily="49" charset="0"/>
-              </a:rPr>
-              <a:t>student</a:t>
+              <a:t>("CREATE TABLE student</a:t>
+            </a:r>
+          </a:p>
+          <a:p>
+            <a:pPr marL="274320" lvl="1" indent="0">
+              <a:buNone/>
+            </a:pPr>
+            <a:r>
+              <a:rPr lang="en-CA" dirty="0">
+                <a:solidFill>
+                  <a:srgbClr val="FF0000"/>
+                </a:solidFill>
+                <a:latin typeface="Courier New" panose="02070309020205020404" pitchFamily="49" charset="0"/>
+                <a:cs typeface="Courier New" panose="02070309020205020404" pitchFamily="49" charset="0"/>
+              </a:rPr>
+              <a:t>(</a:t>
+            </a:r>
+            <a:r>
+              <a:rPr lang="en-CA" dirty="0" err="1">
+                <a:solidFill>
+                  <a:srgbClr val="FF0000"/>
+                </a:solidFill>
+                <a:latin typeface="Courier New" panose="02070309020205020404" pitchFamily="49" charset="0"/>
+                <a:cs typeface="Courier New" panose="02070309020205020404" pitchFamily="49" charset="0"/>
+              </a:rPr>
+              <a:t>s_id</a:t>
+            </a:r>
+            <a:r>
+              <a:rPr lang="en-CA" dirty="0">
+                <a:solidFill>
+                  <a:srgbClr val="FF0000"/>
+                </a:solidFill>
+                <a:latin typeface="Courier New" panose="02070309020205020404" pitchFamily="49" charset="0"/>
+                <a:cs typeface="Courier New" panose="02070309020205020404" pitchFamily="49" charset="0"/>
+              </a:rPr>
+              <a:t> NUMBER(4), name VARCHAR2(40))");</a:t>
+            </a:r>
+          </a:p>
+          <a:p>
+            <a:r>
+              <a:rPr lang="en-US" dirty="0"/>
+              <a:t>To insert values into a table</a:t>
+            </a:r>
+          </a:p>
+          <a:p>
+            <a:pPr marL="274320" lvl="1" indent="0">
+              <a:buNone/>
+            </a:pPr>
+            <a:r>
+              <a:rPr lang="en-US" dirty="0" err="1">
+                <a:solidFill>
+                  <a:srgbClr val="FF0000"/>
+                </a:solidFill>
+                <a:latin typeface="Courier New" panose="02070309020205020404" pitchFamily="49" charset="0"/>
+                <a:cs typeface="Courier New" panose="02070309020205020404" pitchFamily="49" charset="0"/>
+              </a:rPr>
+              <a:t>stmt</a:t>
+            </a:r>
+            <a:r>
+              <a:rPr lang="en-US" dirty="0">
+                <a:solidFill>
+                  <a:srgbClr val="FF0000"/>
+                </a:solidFill>
+                <a:latin typeface="Courier New" panose="02070309020205020404" pitchFamily="49" charset="0"/>
+                <a:cs typeface="Courier New" panose="02070309020205020404" pitchFamily="49" charset="0"/>
+              </a:rPr>
+              <a:t>-&gt;</a:t>
+            </a:r>
+            <a:r>
+              <a:rPr lang="en-US" dirty="0" err="1">
+                <a:solidFill>
+                  <a:srgbClr val="FF0000"/>
+                </a:solidFill>
+                <a:latin typeface="Courier New" panose="02070309020205020404" pitchFamily="49" charset="0"/>
+                <a:cs typeface="Courier New" panose="02070309020205020404" pitchFamily="49" charset="0"/>
+              </a:rPr>
+              <a:t>executeUpdate</a:t>
+            </a:r>
+            <a:r>
+              <a:rPr lang="en-US" dirty="0">
+                <a:solidFill>
+                  <a:srgbClr val="FF0000"/>
+                </a:solidFill>
+                <a:latin typeface="Courier New" panose="02070309020205020404" pitchFamily="49" charset="0"/>
+                <a:cs typeface="Courier New" panose="02070309020205020404" pitchFamily="49" charset="0"/>
+              </a:rPr>
+              <a:t>("INSERT INTO student</a:t>
+            </a:r>
+          </a:p>
+          <a:p>
+            <a:pPr marL="274320" lvl="1" indent="0">
+              <a:buNone/>
+            </a:pPr>
+            <a:r>
+              <a:rPr lang="en-CA" dirty="0">
+                <a:solidFill>
+                  <a:srgbClr val="FF0000"/>
+                </a:solidFill>
+                <a:latin typeface="Courier New" panose="02070309020205020404" pitchFamily="49" charset="0"/>
+                <a:cs typeface="Courier New" panose="02070309020205020404" pitchFamily="49" charset="0"/>
+              </a:rPr>
+              <a:t>VALUES(10, ‘Sarah Stone')");</a:t>
             </a:r>
             <a:endParaRPr lang="en-US" dirty="0">
               <a:solidFill>
@@ -11456,137 +10757,8 @@
             </a:endParaRPr>
           </a:p>
           <a:p>
-            <a:pPr marL="274320" lvl="1" indent="0">
-              <a:buNone/>
-            </a:pPr>
-            <a:r>
-              <a:rPr lang="en-CA" dirty="0" smtClean="0">
-                <a:solidFill>
-                  <a:srgbClr val="FF0000"/>
-                </a:solidFill>
-                <a:latin typeface="Courier New" panose="02070309020205020404" pitchFamily="49" charset="0"/>
-                <a:cs typeface="Courier New" panose="02070309020205020404" pitchFamily="49" charset="0"/>
-              </a:rPr>
-              <a:t>(</a:t>
-            </a:r>
-            <a:r>
-              <a:rPr lang="en-CA" dirty="0" err="1" smtClean="0">
-                <a:solidFill>
-                  <a:srgbClr val="FF0000"/>
-                </a:solidFill>
-                <a:latin typeface="Courier New" panose="02070309020205020404" pitchFamily="49" charset="0"/>
-                <a:cs typeface="Courier New" panose="02070309020205020404" pitchFamily="49" charset="0"/>
-              </a:rPr>
-              <a:t>s_id</a:t>
-            </a:r>
-            <a:r>
-              <a:rPr lang="en-CA" dirty="0" smtClean="0">
-                <a:solidFill>
-                  <a:srgbClr val="FF0000"/>
-                </a:solidFill>
-                <a:latin typeface="Courier New" panose="02070309020205020404" pitchFamily="49" charset="0"/>
-                <a:cs typeface="Courier New" panose="02070309020205020404" pitchFamily="49" charset="0"/>
-              </a:rPr>
-              <a:t> NUMBER(4), name VARCHAR2(40))");</a:t>
-            </a:r>
-          </a:p>
-          <a:p>
-            <a:r>
-              <a:rPr lang="en-US" dirty="0"/>
-              <a:t>To insert values into a </a:t>
-            </a:r>
-            <a:r>
-              <a:rPr lang="en-US" dirty="0" smtClean="0"/>
-              <a:t>table</a:t>
-            </a:r>
-          </a:p>
-          <a:p>
-            <a:pPr marL="274320" lvl="1" indent="0">
-              <a:buNone/>
-            </a:pPr>
-            <a:r>
-              <a:rPr lang="en-US" dirty="0" err="1">
-                <a:solidFill>
-                  <a:srgbClr val="FF0000"/>
-                </a:solidFill>
-                <a:latin typeface="Courier New" panose="02070309020205020404" pitchFamily="49" charset="0"/>
-                <a:cs typeface="Courier New" panose="02070309020205020404" pitchFamily="49" charset="0"/>
-              </a:rPr>
-              <a:t>stmt</a:t>
-            </a:r>
-            <a:r>
-              <a:rPr lang="en-US" dirty="0">
-                <a:solidFill>
-                  <a:srgbClr val="FF0000"/>
-                </a:solidFill>
-                <a:latin typeface="Courier New" panose="02070309020205020404" pitchFamily="49" charset="0"/>
-                <a:cs typeface="Courier New" panose="02070309020205020404" pitchFamily="49" charset="0"/>
-              </a:rPr>
-              <a:t>-&gt;</a:t>
-            </a:r>
-            <a:r>
-              <a:rPr lang="en-US" dirty="0" err="1">
-                <a:solidFill>
-                  <a:srgbClr val="FF0000"/>
-                </a:solidFill>
-                <a:latin typeface="Courier New" panose="02070309020205020404" pitchFamily="49" charset="0"/>
-                <a:cs typeface="Courier New" panose="02070309020205020404" pitchFamily="49" charset="0"/>
-              </a:rPr>
-              <a:t>executeUpdate</a:t>
-            </a:r>
-            <a:r>
-              <a:rPr lang="en-US" dirty="0">
-                <a:solidFill>
-                  <a:srgbClr val="FF0000"/>
-                </a:solidFill>
-                <a:latin typeface="Courier New" panose="02070309020205020404" pitchFamily="49" charset="0"/>
-                <a:cs typeface="Courier New" panose="02070309020205020404" pitchFamily="49" charset="0"/>
-              </a:rPr>
-              <a:t>("INSERT INTO </a:t>
-            </a:r>
-            <a:r>
-              <a:rPr lang="en-US" dirty="0" smtClean="0">
-                <a:solidFill>
-                  <a:srgbClr val="FF0000"/>
-                </a:solidFill>
-                <a:latin typeface="Courier New" panose="02070309020205020404" pitchFamily="49" charset="0"/>
-                <a:cs typeface="Courier New" panose="02070309020205020404" pitchFamily="49" charset="0"/>
-              </a:rPr>
-              <a:t>student</a:t>
-            </a:r>
+            <a:pPr lvl="1"/>
             <a:endParaRPr lang="en-US" dirty="0">
-              <a:solidFill>
-                <a:srgbClr val="FF0000"/>
-              </a:solidFill>
-              <a:latin typeface="Courier New" panose="02070309020205020404" pitchFamily="49" charset="0"/>
-              <a:cs typeface="Courier New" panose="02070309020205020404" pitchFamily="49" charset="0"/>
-            </a:endParaRPr>
-          </a:p>
-          <a:p>
-            <a:pPr marL="274320" lvl="1" indent="0">
-              <a:buNone/>
-            </a:pPr>
-            <a:r>
-              <a:rPr lang="en-CA" dirty="0" smtClean="0">
-                <a:solidFill>
-                  <a:srgbClr val="FF0000"/>
-                </a:solidFill>
-                <a:latin typeface="Courier New" panose="02070309020205020404" pitchFamily="49" charset="0"/>
-                <a:cs typeface="Courier New" panose="02070309020205020404" pitchFamily="49" charset="0"/>
-              </a:rPr>
-              <a:t>VALUES(10, ‘Sarah Stone')");</a:t>
-            </a:r>
-            <a:endParaRPr lang="en-US" dirty="0">
-              <a:solidFill>
-                <a:srgbClr val="FF0000"/>
-              </a:solidFill>
-              <a:latin typeface="Courier New" panose="02070309020205020404" pitchFamily="49" charset="0"/>
-              <a:cs typeface="Courier New" panose="02070309020205020404" pitchFamily="49" charset="0"/>
-            </a:endParaRPr>
-          </a:p>
-          <a:p>
-            <a:pPr lvl="1"/>
-            <a:endParaRPr lang="en-US" dirty="0" smtClean="0">
               <a:solidFill>
                 <a:srgbClr val="FF0000"/>
               </a:solidFill>

</xml_diff>